<commit_message>
Attempting to knit to pptx but execution keeps getting halted.
</commit_message>
<xml_diff>
--- a/Films_raw_theme.pptx
+++ b/Films_raw_theme.pptx
@@ -155,6 +155,466 @@
 </p188:authorLst>
 </file>
 
+<file path=ppt/revisionInfo.xml><?xml version="1.0" encoding="utf-8"?>
+<p1510:revInfo xmlns:a="http://schemas.openxmlformats.org/drawingml/2006/main" xmlns:r="http://schemas.openxmlformats.org/officeDocument/2006/relationships" xmlns:p1510="http://schemas.microsoft.com/office/powerpoint/2015/10/main">
+  <p1510:revLst>
+    <p1510:client id="{75E7FFCF-80B9-4C69-BFD2-0EFC42D4CD21}" v="12" dt="2024-04-25T10:15:44.125"/>
+  </p1510:revLst>
+</p1510:revInfo>
+</file>
+
+<file path=ppt/changesInfos/changesInfo1.xml><?xml version="1.0" encoding="utf-8"?>
+<pc:chgInfo xmlns:a="http://schemas.openxmlformats.org/drawingml/2006/main" xmlns:r="http://schemas.openxmlformats.org/officeDocument/2006/relationships" xmlns:ac="http://schemas.microsoft.com/office/drawing/2013/main/command" xmlns:pc="http://schemas.microsoft.com/office/powerpoint/2013/main/command">
+  <pc:docChgLst>
+    <pc:chgData name="Rose Campos" userId="ea77ee4111b22c87" providerId="LiveId" clId="{75E7FFCF-80B9-4C69-BFD2-0EFC42D4CD21}"/>
+    <pc:docChg chg="custSel modSld modMainMaster">
+      <pc:chgData name="Rose Campos" userId="ea77ee4111b22c87" providerId="LiveId" clId="{75E7FFCF-80B9-4C69-BFD2-0EFC42D4CD21}" dt="2024-04-25T10:15:44.125" v="28"/>
+      <pc:docMkLst>
+        <pc:docMk/>
+      </pc:docMkLst>
+      <pc:sldChg chg="modSp">
+        <pc:chgData name="Rose Campos" userId="ea77ee4111b22c87" providerId="LiveId" clId="{75E7FFCF-80B9-4C69-BFD2-0EFC42D4CD21}" dt="2024-04-25T10:15:44.125" v="28"/>
+        <pc:sldMkLst>
+          <pc:docMk/>
+          <pc:sldMk cId="3037812869" sldId="316"/>
+        </pc:sldMkLst>
+        <pc:spChg chg="mod">
+          <ac:chgData name="Rose Campos" userId="ea77ee4111b22c87" providerId="LiveId" clId="{75E7FFCF-80B9-4C69-BFD2-0EFC42D4CD21}" dt="2024-04-25T10:15:44.125" v="28"/>
+          <ac:spMkLst>
+            <pc:docMk/>
+            <pc:sldMk cId="3037812869" sldId="316"/>
+            <ac:spMk id="2" creationId="{9FF243DF-1FE9-01BE-435F-1729F4AB3DE4}"/>
+          </ac:spMkLst>
+        </pc:spChg>
+        <pc:spChg chg="mod">
+          <ac:chgData name="Rose Campos" userId="ea77ee4111b22c87" providerId="LiveId" clId="{75E7FFCF-80B9-4C69-BFD2-0EFC42D4CD21}" dt="2024-04-25T10:15:44.125" v="28"/>
+          <ac:spMkLst>
+            <pc:docMk/>
+            <pc:sldMk cId="3037812869" sldId="316"/>
+            <ac:spMk id="4" creationId="{BFAF7377-87AF-3A8C-539C-8A9651F5DA33}"/>
+          </ac:spMkLst>
+        </pc:spChg>
+      </pc:sldChg>
+      <pc:sldChg chg="modSp">
+        <pc:chgData name="Rose Campos" userId="ea77ee4111b22c87" providerId="LiveId" clId="{75E7FFCF-80B9-4C69-BFD2-0EFC42D4CD21}" dt="2024-04-25T10:15:44.125" v="28"/>
+        <pc:sldMkLst>
+          <pc:docMk/>
+          <pc:sldMk cId="2102816447" sldId="324"/>
+        </pc:sldMkLst>
+        <pc:spChg chg="mod">
+          <ac:chgData name="Rose Campos" userId="ea77ee4111b22c87" providerId="LiveId" clId="{75E7FFCF-80B9-4C69-BFD2-0EFC42D4CD21}" dt="2024-04-25T10:15:44.125" v="28"/>
+          <ac:spMkLst>
+            <pc:docMk/>
+            <pc:sldMk cId="2102816447" sldId="324"/>
+            <ac:spMk id="2" creationId="{88B8FDAA-00CD-846E-A576-B59DFA73F988}"/>
+          </ac:spMkLst>
+        </pc:spChg>
+        <pc:spChg chg="mod">
+          <ac:chgData name="Rose Campos" userId="ea77ee4111b22c87" providerId="LiveId" clId="{75E7FFCF-80B9-4C69-BFD2-0EFC42D4CD21}" dt="2024-04-25T10:15:44.125" v="28"/>
+          <ac:spMkLst>
+            <pc:docMk/>
+            <pc:sldMk cId="2102816447" sldId="324"/>
+            <ac:spMk id="4" creationId="{352B3B4A-6ED2-64D9-BEC7-1B6C66971286}"/>
+          </ac:spMkLst>
+        </pc:spChg>
+        <pc:spChg chg="mod">
+          <ac:chgData name="Rose Campos" userId="ea77ee4111b22c87" providerId="LiveId" clId="{75E7FFCF-80B9-4C69-BFD2-0EFC42D4CD21}" dt="2024-04-25T10:15:44.125" v="28"/>
+          <ac:spMkLst>
+            <pc:docMk/>
+            <pc:sldMk cId="2102816447" sldId="324"/>
+            <ac:spMk id="6" creationId="{62FF1654-306D-262A-D360-5E5C2E6B39E3}"/>
+          </ac:spMkLst>
+        </pc:spChg>
+      </pc:sldChg>
+      <pc:sldChg chg="modSp">
+        <pc:chgData name="Rose Campos" userId="ea77ee4111b22c87" providerId="LiveId" clId="{75E7FFCF-80B9-4C69-BFD2-0EFC42D4CD21}" dt="2024-04-25T10:15:44.125" v="28"/>
+        <pc:sldMkLst>
+          <pc:docMk/>
+          <pc:sldMk cId="3638111570" sldId="328"/>
+        </pc:sldMkLst>
+        <pc:spChg chg="mod">
+          <ac:chgData name="Rose Campos" userId="ea77ee4111b22c87" providerId="LiveId" clId="{75E7FFCF-80B9-4C69-BFD2-0EFC42D4CD21}" dt="2024-04-25T10:15:44.125" v="28"/>
+          <ac:spMkLst>
+            <pc:docMk/>
+            <pc:sldMk cId="3638111570" sldId="328"/>
+            <ac:spMk id="3" creationId="{3247ABD4-990A-BAC8-69FC-AF4C84F3AD63}"/>
+          </ac:spMkLst>
+        </pc:spChg>
+        <pc:spChg chg="mod">
+          <ac:chgData name="Rose Campos" userId="ea77ee4111b22c87" providerId="LiveId" clId="{75E7FFCF-80B9-4C69-BFD2-0EFC42D4CD21}" dt="2024-04-25T10:15:44.125" v="28"/>
+          <ac:spMkLst>
+            <pc:docMk/>
+            <pc:sldMk cId="3638111570" sldId="328"/>
+            <ac:spMk id="9" creationId="{61E6A21B-7748-174B-D77E-8EE0B288C7D0}"/>
+          </ac:spMkLst>
+        </pc:spChg>
+        <pc:picChg chg="mod">
+          <ac:chgData name="Rose Campos" userId="ea77ee4111b22c87" providerId="LiveId" clId="{75E7FFCF-80B9-4C69-BFD2-0EFC42D4CD21}" dt="2024-04-25T10:15:44.125" v="28"/>
+          <ac:picMkLst>
+            <pc:docMk/>
+            <pc:sldMk cId="3638111570" sldId="328"/>
+            <ac:picMk id="6" creationId="{1472EB4E-1296-AC66-19FA-B01BB8D8A5F8}"/>
+          </ac:picMkLst>
+        </pc:picChg>
+      </pc:sldChg>
+      <pc:sldChg chg="modSp">
+        <pc:chgData name="Rose Campos" userId="ea77ee4111b22c87" providerId="LiveId" clId="{75E7FFCF-80B9-4C69-BFD2-0EFC42D4CD21}" dt="2024-04-25T10:15:44.125" v="28"/>
+        <pc:sldMkLst>
+          <pc:docMk/>
+          <pc:sldMk cId="3811950613" sldId="331"/>
+        </pc:sldMkLst>
+        <pc:spChg chg="mod">
+          <ac:chgData name="Rose Campos" userId="ea77ee4111b22c87" providerId="LiveId" clId="{75E7FFCF-80B9-4C69-BFD2-0EFC42D4CD21}" dt="2024-04-25T10:15:44.125" v="28"/>
+          <ac:spMkLst>
+            <pc:docMk/>
+            <pc:sldMk cId="3811950613" sldId="331"/>
+            <ac:spMk id="10" creationId="{C1E42FE3-72C0-8885-D01D-FC08E0DEC223}"/>
+          </ac:spMkLst>
+        </pc:spChg>
+        <pc:spChg chg="mod">
+          <ac:chgData name="Rose Campos" userId="ea77ee4111b22c87" providerId="LiveId" clId="{75E7FFCF-80B9-4C69-BFD2-0EFC42D4CD21}" dt="2024-04-25T10:15:44.125" v="28"/>
+          <ac:spMkLst>
+            <pc:docMk/>
+            <pc:sldMk cId="3811950613" sldId="331"/>
+            <ac:spMk id="23" creationId="{E16BFA7C-979F-1D5E-79D4-DEEC56EBE216}"/>
+          </ac:spMkLst>
+        </pc:spChg>
+        <pc:spChg chg="mod">
+          <ac:chgData name="Rose Campos" userId="ea77ee4111b22c87" providerId="LiveId" clId="{75E7FFCF-80B9-4C69-BFD2-0EFC42D4CD21}" dt="2024-04-25T10:15:44.125" v="28"/>
+          <ac:spMkLst>
+            <pc:docMk/>
+            <pc:sldMk cId="3811950613" sldId="331"/>
+            <ac:spMk id="25" creationId="{B4A8555D-2DFF-E6D8-3698-67C06B770264}"/>
+          </ac:spMkLst>
+        </pc:spChg>
+      </pc:sldChg>
+      <pc:sldChg chg="modSp">
+        <pc:chgData name="Rose Campos" userId="ea77ee4111b22c87" providerId="LiveId" clId="{75E7FFCF-80B9-4C69-BFD2-0EFC42D4CD21}" dt="2024-04-25T10:15:44.125" v="28"/>
+        <pc:sldMkLst>
+          <pc:docMk/>
+          <pc:sldMk cId="2955403071" sldId="334"/>
+        </pc:sldMkLst>
+        <pc:spChg chg="mod">
+          <ac:chgData name="Rose Campos" userId="ea77ee4111b22c87" providerId="LiveId" clId="{75E7FFCF-80B9-4C69-BFD2-0EFC42D4CD21}" dt="2024-04-25T10:15:44.125" v="28"/>
+          <ac:spMkLst>
+            <pc:docMk/>
+            <pc:sldMk cId="2955403071" sldId="334"/>
+            <ac:spMk id="2" creationId="{C3A9968B-2619-4F71-AB00-4C493E120805}"/>
+          </ac:spMkLst>
+        </pc:spChg>
+      </pc:sldChg>
+      <pc:sldChg chg="modSp mod">
+        <pc:chgData name="Rose Campos" userId="ea77ee4111b22c87" providerId="LiveId" clId="{75E7FFCF-80B9-4C69-BFD2-0EFC42D4CD21}" dt="2024-04-25T10:15:44.125" v="28"/>
+        <pc:sldMkLst>
+          <pc:docMk/>
+          <pc:sldMk cId="3749168723" sldId="336"/>
+        </pc:sldMkLst>
+        <pc:spChg chg="mod">
+          <ac:chgData name="Rose Campos" userId="ea77ee4111b22c87" providerId="LiveId" clId="{75E7FFCF-80B9-4C69-BFD2-0EFC42D4CD21}" dt="2024-04-25T10:15:44.125" v="28"/>
+          <ac:spMkLst>
+            <pc:docMk/>
+            <pc:sldMk cId="3749168723" sldId="336"/>
+            <ac:spMk id="4" creationId="{95698432-2D58-D940-A0AE-7748E2A4879B}"/>
+          </ac:spMkLst>
+        </pc:spChg>
+        <pc:spChg chg="mod">
+          <ac:chgData name="Rose Campos" userId="ea77ee4111b22c87" providerId="LiveId" clId="{75E7FFCF-80B9-4C69-BFD2-0EFC42D4CD21}" dt="2024-04-25T10:15:44.125" v="28"/>
+          <ac:spMkLst>
+            <pc:docMk/>
+            <pc:sldMk cId="3749168723" sldId="336"/>
+            <ac:spMk id="7" creationId="{4C780BDD-62B7-3E51-C2DE-09259F62CC03}"/>
+          </ac:spMkLst>
+        </pc:spChg>
+      </pc:sldChg>
+      <pc:sldChg chg="modSp">
+        <pc:chgData name="Rose Campos" userId="ea77ee4111b22c87" providerId="LiveId" clId="{75E7FFCF-80B9-4C69-BFD2-0EFC42D4CD21}" dt="2024-04-25T10:15:44.125" v="28"/>
+        <pc:sldMkLst>
+          <pc:docMk/>
+          <pc:sldMk cId="1941235776" sldId="337"/>
+        </pc:sldMkLst>
+        <pc:spChg chg="mod">
+          <ac:chgData name="Rose Campos" userId="ea77ee4111b22c87" providerId="LiveId" clId="{75E7FFCF-80B9-4C69-BFD2-0EFC42D4CD21}" dt="2024-04-25T10:15:44.125" v="28"/>
+          <ac:spMkLst>
+            <pc:docMk/>
+            <pc:sldMk cId="1941235776" sldId="337"/>
+            <ac:spMk id="2" creationId="{8695A271-8875-6BCE-0A4A-542683BB3917}"/>
+          </ac:spMkLst>
+        </pc:spChg>
+        <pc:picChg chg="mod">
+          <ac:chgData name="Rose Campos" userId="ea77ee4111b22c87" providerId="LiveId" clId="{75E7FFCF-80B9-4C69-BFD2-0EFC42D4CD21}" dt="2024-04-25T10:15:44.125" v="28"/>
+          <ac:picMkLst>
+            <pc:docMk/>
+            <pc:sldMk cId="1941235776" sldId="337"/>
+            <ac:picMk id="7" creationId="{DABEABE1-2983-8759-E3F7-CCC6330C6BA1}"/>
+          </ac:picMkLst>
+        </pc:picChg>
+      </pc:sldChg>
+      <pc:sldChg chg="modSp">
+        <pc:chgData name="Rose Campos" userId="ea77ee4111b22c87" providerId="LiveId" clId="{75E7FFCF-80B9-4C69-BFD2-0EFC42D4CD21}" dt="2024-04-25T10:15:44.125" v="28"/>
+        <pc:sldMkLst>
+          <pc:docMk/>
+          <pc:sldMk cId="1450287420" sldId="342"/>
+        </pc:sldMkLst>
+        <pc:spChg chg="mod">
+          <ac:chgData name="Rose Campos" userId="ea77ee4111b22c87" providerId="LiveId" clId="{75E7FFCF-80B9-4C69-BFD2-0EFC42D4CD21}" dt="2024-04-25T10:15:44.125" v="28"/>
+          <ac:spMkLst>
+            <pc:docMk/>
+            <pc:sldMk cId="1450287420" sldId="342"/>
+            <ac:spMk id="3" creationId="{D4418541-7290-F1A9-2357-CA26E074EF45}"/>
+          </ac:spMkLst>
+        </pc:spChg>
+        <pc:spChg chg="mod">
+          <ac:chgData name="Rose Campos" userId="ea77ee4111b22c87" providerId="LiveId" clId="{75E7FFCF-80B9-4C69-BFD2-0EFC42D4CD21}" dt="2024-04-25T10:15:44.125" v="28"/>
+          <ac:spMkLst>
+            <pc:docMk/>
+            <pc:sldMk cId="1450287420" sldId="342"/>
+            <ac:spMk id="12" creationId="{F64C0E11-7DE4-D558-C3EF-9B3C7A9BF17D}"/>
+          </ac:spMkLst>
+        </pc:spChg>
+        <pc:picChg chg="mod">
+          <ac:chgData name="Rose Campos" userId="ea77ee4111b22c87" providerId="LiveId" clId="{75E7FFCF-80B9-4C69-BFD2-0EFC42D4CD21}" dt="2024-04-25T10:15:44.125" v="28"/>
+          <ac:picMkLst>
+            <pc:docMk/>
+            <pc:sldMk cId="1450287420" sldId="342"/>
+            <ac:picMk id="13" creationId="{06CC7187-0D55-8D17-DB17-83EAB1EF8D05}"/>
+          </ac:picMkLst>
+        </pc:picChg>
+      </pc:sldChg>
+      <pc:sldChg chg="modSp">
+        <pc:chgData name="Rose Campos" userId="ea77ee4111b22c87" providerId="LiveId" clId="{75E7FFCF-80B9-4C69-BFD2-0EFC42D4CD21}" dt="2024-04-25T10:15:44.125" v="28"/>
+        <pc:sldMkLst>
+          <pc:docMk/>
+          <pc:sldMk cId="3962753978" sldId="343"/>
+        </pc:sldMkLst>
+        <pc:spChg chg="mod">
+          <ac:chgData name="Rose Campos" userId="ea77ee4111b22c87" providerId="LiveId" clId="{75E7FFCF-80B9-4C69-BFD2-0EFC42D4CD21}" dt="2024-04-25T10:15:44.125" v="28"/>
+          <ac:spMkLst>
+            <pc:docMk/>
+            <pc:sldMk cId="3962753978" sldId="343"/>
+            <ac:spMk id="2" creationId="{A6768171-F501-5EC9-8849-5D0FE73AE00B}"/>
+          </ac:spMkLst>
+        </pc:spChg>
+        <pc:spChg chg="mod">
+          <ac:chgData name="Rose Campos" userId="ea77ee4111b22c87" providerId="LiveId" clId="{75E7FFCF-80B9-4C69-BFD2-0EFC42D4CD21}" dt="2024-04-25T10:15:44.125" v="28"/>
+          <ac:spMkLst>
+            <pc:docMk/>
+            <pc:sldMk cId="3962753978" sldId="343"/>
+            <ac:spMk id="3" creationId="{338A9D03-6CF8-D31E-2E06-88AEBCEF7D9B}"/>
+          </ac:spMkLst>
+        </pc:spChg>
+        <pc:picChg chg="mod">
+          <ac:chgData name="Rose Campos" userId="ea77ee4111b22c87" providerId="LiveId" clId="{75E7FFCF-80B9-4C69-BFD2-0EFC42D4CD21}" dt="2024-04-25T10:15:44.125" v="28"/>
+          <ac:picMkLst>
+            <pc:docMk/>
+            <pc:sldMk cId="3962753978" sldId="343"/>
+            <ac:picMk id="6" creationId="{56606EF5-1CC7-5421-5CF4-C03704056CCA}"/>
+          </ac:picMkLst>
+        </pc:picChg>
+      </pc:sldChg>
+      <pc:sldChg chg="modSp">
+        <pc:chgData name="Rose Campos" userId="ea77ee4111b22c87" providerId="LiveId" clId="{75E7FFCF-80B9-4C69-BFD2-0EFC42D4CD21}" dt="2024-04-25T10:15:44.125" v="28"/>
+        <pc:sldMkLst>
+          <pc:docMk/>
+          <pc:sldMk cId="2520582305" sldId="345"/>
+        </pc:sldMkLst>
+        <pc:spChg chg="mod">
+          <ac:chgData name="Rose Campos" userId="ea77ee4111b22c87" providerId="LiveId" clId="{75E7FFCF-80B9-4C69-BFD2-0EFC42D4CD21}" dt="2024-04-25T10:15:44.125" v="28"/>
+          <ac:spMkLst>
+            <pc:docMk/>
+            <pc:sldMk cId="2520582305" sldId="345"/>
+            <ac:spMk id="8" creationId="{27B8245B-90F5-42D5-BB2F-B23140DB200C}"/>
+          </ac:spMkLst>
+        </pc:spChg>
+        <pc:spChg chg="mod">
+          <ac:chgData name="Rose Campos" userId="ea77ee4111b22c87" providerId="LiveId" clId="{75E7FFCF-80B9-4C69-BFD2-0EFC42D4CD21}" dt="2024-04-25T10:15:44.125" v="28"/>
+          <ac:spMkLst>
+            <pc:docMk/>
+            <pc:sldMk cId="2520582305" sldId="345"/>
+            <ac:spMk id="10" creationId="{47262961-9495-E252-E690-1E733A8CCE57}"/>
+          </ac:spMkLst>
+        </pc:spChg>
+        <pc:graphicFrameChg chg="mod">
+          <ac:chgData name="Rose Campos" userId="ea77ee4111b22c87" providerId="LiveId" clId="{75E7FFCF-80B9-4C69-BFD2-0EFC42D4CD21}" dt="2024-04-25T10:15:44.125" v="28"/>
+          <ac:graphicFrameMkLst>
+            <pc:docMk/>
+            <pc:sldMk cId="2520582305" sldId="345"/>
+            <ac:graphicFrameMk id="6" creationId="{6AF13B15-615A-B282-84CE-BCE3A52AFAF2}"/>
+          </ac:graphicFrameMkLst>
+        </pc:graphicFrameChg>
+      </pc:sldChg>
+      <pc:sldChg chg="modSp">
+        <pc:chgData name="Rose Campos" userId="ea77ee4111b22c87" providerId="LiveId" clId="{75E7FFCF-80B9-4C69-BFD2-0EFC42D4CD21}" dt="2024-04-25T10:15:44.125" v="28"/>
+        <pc:sldMkLst>
+          <pc:docMk/>
+          <pc:sldMk cId="719664809" sldId="346"/>
+        </pc:sldMkLst>
+        <pc:spChg chg="mod">
+          <ac:chgData name="Rose Campos" userId="ea77ee4111b22c87" providerId="LiveId" clId="{75E7FFCF-80B9-4C69-BFD2-0EFC42D4CD21}" dt="2024-04-25T10:15:44.125" v="28"/>
+          <ac:spMkLst>
+            <pc:docMk/>
+            <pc:sldMk cId="719664809" sldId="346"/>
+            <ac:spMk id="2" creationId="{D58E24D3-07BE-C483-3F42-95EEE83332F6}"/>
+          </ac:spMkLst>
+        </pc:spChg>
+        <pc:spChg chg="mod">
+          <ac:chgData name="Rose Campos" userId="ea77ee4111b22c87" providerId="LiveId" clId="{75E7FFCF-80B9-4C69-BFD2-0EFC42D4CD21}" dt="2024-04-25T10:15:44.125" v="28"/>
+          <ac:spMkLst>
+            <pc:docMk/>
+            <pc:sldMk cId="719664809" sldId="346"/>
+            <ac:spMk id="11" creationId="{762FCA4D-7EEE-9E3D-F691-FEFB5FB337E6}"/>
+          </ac:spMkLst>
+        </pc:spChg>
+        <pc:spChg chg="mod">
+          <ac:chgData name="Rose Campos" userId="ea77ee4111b22c87" providerId="LiveId" clId="{75E7FFCF-80B9-4C69-BFD2-0EFC42D4CD21}" dt="2024-04-25T10:15:44.125" v="28"/>
+          <ac:spMkLst>
+            <pc:docMk/>
+            <pc:sldMk cId="719664809" sldId="346"/>
+            <ac:spMk id="18" creationId="{828FD192-492A-A40D-E86A-BABC77587C80}"/>
+          </ac:spMkLst>
+        </pc:spChg>
+        <pc:spChg chg="mod">
+          <ac:chgData name="Rose Campos" userId="ea77ee4111b22c87" providerId="LiveId" clId="{75E7FFCF-80B9-4C69-BFD2-0EFC42D4CD21}" dt="2024-04-25T10:15:44.125" v="28"/>
+          <ac:spMkLst>
+            <pc:docMk/>
+            <pc:sldMk cId="719664809" sldId="346"/>
+            <ac:spMk id="63" creationId="{9EFE5C42-059F-482E-C029-E8FA5107EEDA}"/>
+          </ac:spMkLst>
+        </pc:spChg>
+      </pc:sldChg>
+      <pc:sldChg chg="modSp">
+        <pc:chgData name="Rose Campos" userId="ea77ee4111b22c87" providerId="LiveId" clId="{75E7FFCF-80B9-4C69-BFD2-0EFC42D4CD21}" dt="2024-04-25T10:15:44.125" v="28"/>
+        <pc:sldMkLst>
+          <pc:docMk/>
+          <pc:sldMk cId="1689351536" sldId="347"/>
+        </pc:sldMkLst>
+        <pc:spChg chg="mod">
+          <ac:chgData name="Rose Campos" userId="ea77ee4111b22c87" providerId="LiveId" clId="{75E7FFCF-80B9-4C69-BFD2-0EFC42D4CD21}" dt="2024-04-25T10:15:44.125" v="28"/>
+          <ac:spMkLst>
+            <pc:docMk/>
+            <pc:sldMk cId="1689351536" sldId="347"/>
+            <ac:spMk id="2" creationId="{2D44923D-C618-15EF-E1D7-7C1B0DBB1D0F}"/>
+          </ac:spMkLst>
+        </pc:spChg>
+      </pc:sldChg>
+      <pc:sldChg chg="modSp">
+        <pc:chgData name="Rose Campos" userId="ea77ee4111b22c87" providerId="LiveId" clId="{75E7FFCF-80B9-4C69-BFD2-0EFC42D4CD21}" dt="2024-04-25T10:15:44.125" v="28"/>
+        <pc:sldMkLst>
+          <pc:docMk/>
+          <pc:sldMk cId="4273949180" sldId="349"/>
+        </pc:sldMkLst>
+        <pc:spChg chg="mod">
+          <ac:chgData name="Rose Campos" userId="ea77ee4111b22c87" providerId="LiveId" clId="{75E7FFCF-80B9-4C69-BFD2-0EFC42D4CD21}" dt="2024-04-25T10:15:44.125" v="28"/>
+          <ac:spMkLst>
+            <pc:docMk/>
+            <pc:sldMk cId="4273949180" sldId="349"/>
+            <ac:spMk id="2" creationId="{5475D893-E98A-260A-9EC4-B9365E533FD5}"/>
+          </ac:spMkLst>
+        </pc:spChg>
+        <pc:spChg chg="mod">
+          <ac:chgData name="Rose Campos" userId="ea77ee4111b22c87" providerId="LiveId" clId="{75E7FFCF-80B9-4C69-BFD2-0EFC42D4CD21}" dt="2024-04-25T10:15:44.125" v="28"/>
+          <ac:spMkLst>
+            <pc:docMk/>
+            <pc:sldMk cId="4273949180" sldId="349"/>
+            <ac:spMk id="3" creationId="{FD70D88C-5989-4007-4953-F54A4A34B778}"/>
+          </ac:spMkLst>
+        </pc:spChg>
+        <pc:picChg chg="mod">
+          <ac:chgData name="Rose Campos" userId="ea77ee4111b22c87" providerId="LiveId" clId="{75E7FFCF-80B9-4C69-BFD2-0EFC42D4CD21}" dt="2024-04-25T10:15:44.125" v="28"/>
+          <ac:picMkLst>
+            <pc:docMk/>
+            <pc:sldMk cId="4273949180" sldId="349"/>
+            <ac:picMk id="5" creationId="{DE72DC91-8DC9-B68C-C1D3-8F5273481A74}"/>
+          </ac:picMkLst>
+        </pc:picChg>
+      </pc:sldChg>
+      <pc:sldMasterChg chg="delSldLayout modSldLayout sldLayoutOrd">
+        <pc:chgData name="Rose Campos" userId="ea77ee4111b22c87" providerId="LiveId" clId="{75E7FFCF-80B9-4C69-BFD2-0EFC42D4CD21}" dt="2024-04-25T10:15:09.733" v="27" actId="2696"/>
+        <pc:sldMasterMkLst>
+          <pc:docMk/>
+          <pc:sldMasterMk cId="1999713800" sldId="2147483696"/>
+        </pc:sldMasterMkLst>
+        <pc:sldLayoutChg chg="del">
+          <pc:chgData name="Rose Campos" userId="ea77ee4111b22c87" providerId="LiveId" clId="{75E7FFCF-80B9-4C69-BFD2-0EFC42D4CD21}" dt="2024-04-25T10:15:09.733" v="27" actId="2696"/>
+          <pc:sldLayoutMkLst>
+            <pc:docMk/>
+            <pc:sldMasterMk cId="1999713800" sldId="2147483696"/>
+            <pc:sldLayoutMk cId="1663291002" sldId="2147483702"/>
+          </pc:sldLayoutMkLst>
+        </pc:sldLayoutChg>
+        <pc:sldLayoutChg chg="addSp modSp mod">
+          <pc:chgData name="Rose Campos" userId="ea77ee4111b22c87" providerId="LiveId" clId="{75E7FFCF-80B9-4C69-BFD2-0EFC42D4CD21}" dt="2024-04-25T10:14:24.055" v="26" actId="20577"/>
+          <pc:sldLayoutMkLst>
+            <pc:docMk/>
+            <pc:sldMasterMk cId="1999713800" sldId="2147483696"/>
+            <pc:sldLayoutMk cId="2137906023" sldId="2147483708"/>
+          </pc:sldLayoutMkLst>
+          <pc:spChg chg="add mod">
+            <ac:chgData name="Rose Campos" userId="ea77ee4111b22c87" providerId="LiveId" clId="{75E7FFCF-80B9-4C69-BFD2-0EFC42D4CD21}" dt="2024-04-25T10:14:24.055" v="26" actId="20577"/>
+            <ac:spMkLst>
+              <pc:docMk/>
+              <pc:sldMasterMk cId="1999713800" sldId="2147483696"/>
+              <pc:sldLayoutMk cId="2137906023" sldId="2147483708"/>
+              <ac:spMk id="3" creationId="{8F93B8C3-8989-63CE-F5E2-8EA9998EA6F3}"/>
+            </ac:spMkLst>
+          </pc:spChg>
+          <pc:spChg chg="add mod">
+            <ac:chgData name="Rose Campos" userId="ea77ee4111b22c87" providerId="LiveId" clId="{75E7FFCF-80B9-4C69-BFD2-0EFC42D4CD21}" dt="2024-04-25T10:14:18.832" v="17" actId="20577"/>
+            <ac:spMkLst>
+              <pc:docMk/>
+              <pc:sldMasterMk cId="1999713800" sldId="2147483696"/>
+              <pc:sldLayoutMk cId="2137906023" sldId="2147483708"/>
+              <ac:spMk id="7" creationId="{6E17C876-2BA0-BA1E-D5BA-625CFA8D5FDD}"/>
+            </ac:spMkLst>
+          </pc:spChg>
+        </pc:sldLayoutChg>
+        <pc:sldLayoutChg chg="ord">
+          <pc:chgData name="Rose Campos" userId="ea77ee4111b22c87" providerId="LiveId" clId="{75E7FFCF-80B9-4C69-BFD2-0EFC42D4CD21}" dt="2024-04-25T10:13:00.343" v="1" actId="20578"/>
+          <pc:sldLayoutMkLst>
+            <pc:docMk/>
+            <pc:sldMasterMk cId="1999713800" sldId="2147483696"/>
+            <pc:sldLayoutMk cId="1897111348" sldId="2147483710"/>
+          </pc:sldLayoutMkLst>
+        </pc:sldLayoutChg>
+        <pc:sldLayoutChg chg="delSp mod">
+          <pc:chgData name="Rose Campos" userId="ea77ee4111b22c87" providerId="LiveId" clId="{75E7FFCF-80B9-4C69-BFD2-0EFC42D4CD21}" dt="2024-04-25T10:12:53" v="0" actId="478"/>
+          <pc:sldLayoutMkLst>
+            <pc:docMk/>
+            <pc:sldMasterMk cId="1999713800" sldId="2147483696"/>
+            <pc:sldLayoutMk cId="3577644934" sldId="2147483727"/>
+          </pc:sldLayoutMkLst>
+          <pc:spChg chg="del">
+            <ac:chgData name="Rose Campos" userId="ea77ee4111b22c87" providerId="LiveId" clId="{75E7FFCF-80B9-4C69-BFD2-0EFC42D4CD21}" dt="2024-04-25T10:12:53" v="0" actId="478"/>
+            <ac:spMkLst>
+              <pc:docMk/>
+              <pc:sldMasterMk cId="1999713800" sldId="2147483696"/>
+              <pc:sldLayoutMk cId="3577644934" sldId="2147483727"/>
+              <ac:spMk id="3" creationId="{EC80FBD9-0977-4B2B-9318-30774BB0947C}"/>
+            </ac:spMkLst>
+          </pc:spChg>
+        </pc:sldLayoutChg>
+        <pc:sldLayoutChg chg="delSp mod ord">
+          <pc:chgData name="Rose Campos" userId="ea77ee4111b22c87" providerId="LiveId" clId="{75E7FFCF-80B9-4C69-BFD2-0EFC42D4CD21}" dt="2024-04-25T10:13:51.396" v="5" actId="6014"/>
+          <pc:sldLayoutMkLst>
+            <pc:docMk/>
+            <pc:sldMasterMk cId="1999713800" sldId="2147483696"/>
+            <pc:sldLayoutMk cId="652645656" sldId="2147483729"/>
+          </pc:sldLayoutMkLst>
+          <pc:spChg chg="del">
+            <ac:chgData name="Rose Campos" userId="ea77ee4111b22c87" providerId="LiveId" clId="{75E7FFCF-80B9-4C69-BFD2-0EFC42D4CD21}" dt="2024-04-25T10:13:24.136" v="3" actId="478"/>
+            <ac:spMkLst>
+              <pc:docMk/>
+              <pc:sldMasterMk cId="1999713800" sldId="2147483696"/>
+              <pc:sldLayoutMk cId="652645656" sldId="2147483729"/>
+              <ac:spMk id="5" creationId="{5DDB7824-50BA-B12F-AD49-CA8953CA3A0E}"/>
+            </ac:spMkLst>
+          </pc:spChg>
+        </pc:sldLayoutChg>
+      </pc:sldMasterChg>
+    </pc:docChg>
+  </pc:docChgLst>
+</pc:chgInfo>
+</file>
+
 <file path=ppt/handoutMasters/handoutMaster1.xml><?xml version="1.0" encoding="utf-8"?>
 <p:handoutMaster xmlns:a="http://schemas.openxmlformats.org/drawingml/2006/main" xmlns:r="http://schemas.openxmlformats.org/officeDocument/2006/relationships" xmlns:p="http://schemas.openxmlformats.org/presentationml/2006/main">
   <p:cSld>
@@ -1787,7 +2247,7 @@
 
 <file path=ppt/slideLayouts/slideLayout1.xml><?xml version="1.0" encoding="utf-8"?>
 <p:sldLayout xmlns:a="http://schemas.openxmlformats.org/drawingml/2006/main" xmlns:r="http://schemas.openxmlformats.org/officeDocument/2006/relationships" xmlns:p="http://schemas.openxmlformats.org/presentationml/2006/main" preserve="1" userDrawn="1">
-  <p:cSld name="Title Only Slide">
+  <p:cSld name="d">
     <p:bg>
       <p:bgPr>
         <a:gradFill>
@@ -1831,13 +2291,13 @@
             <a:spLocks noGrp="1"/>
           </p:cNvSpPr>
           <p:nvPr>
-            <p:ph type="ctrTitle"/>
+            <p:ph type="ctrTitle" hasCustomPrompt="1"/>
           </p:nvPr>
         </p:nvSpPr>
         <p:spPr>
           <a:xfrm>
-            <a:off x="1280159" y="357809"/>
-            <a:ext cx="7983110" cy="3080335"/>
+            <a:off x="1280159" y="640080"/>
+            <a:ext cx="10302240" cy="1852046"/>
           </a:xfrm>
         </p:spPr>
         <p:txBody>
@@ -1857,7 +2317,84 @@
           <a:p>
             <a:r>
               <a:rPr lang="en-US" dirty="0"/>
-              <a:t>Click to edit Master title style</a:t>
+              <a:t>Click to add title</a:t>
+            </a:r>
+          </a:p>
+        </p:txBody>
+      </p:sp>
+      <p:sp>
+        <p:nvSpPr>
+          <p:cNvPr id="3" name="Subtitle 2">
+            <a:extLst>
+              <a:ext uri="{FF2B5EF4-FFF2-40B4-BE49-F238E27FC236}">
+                <a16:creationId xmlns:a16="http://schemas.microsoft.com/office/drawing/2014/main" id="{EC80FBD9-0977-4B2B-9318-30774BB0947C}"/>
+              </a:ext>
+            </a:extLst>
+          </p:cNvPr>
+          <p:cNvSpPr>
+            <a:spLocks noGrp="1"/>
+          </p:cNvSpPr>
+          <p:nvPr>
+            <p:ph type="subTitle" idx="1" hasCustomPrompt="1"/>
+          </p:nvPr>
+        </p:nvSpPr>
+        <p:spPr>
+          <a:xfrm>
+            <a:off x="1280158" y="2588447"/>
+            <a:ext cx="7853678" cy="726645"/>
+          </a:xfrm>
+        </p:spPr>
+        <p:txBody>
+          <a:bodyPr lIns="0" tIns="0" rIns="0" bIns="0" anchor="t" anchorCtr="0">
+            <a:normAutofit/>
+          </a:bodyPr>
+          <a:lstStyle>
+            <a:lvl1pPr marL="0" indent="0" algn="l">
+              <a:buNone/>
+              <a:defRPr sz="2400">
+                <a:solidFill>
+                  <a:schemeClr val="bg1"/>
+                </a:solidFill>
+              </a:defRPr>
+            </a:lvl1pPr>
+            <a:lvl2pPr marL="457200" indent="0" algn="ctr">
+              <a:buNone/>
+              <a:defRPr sz="2000"/>
+            </a:lvl2pPr>
+            <a:lvl3pPr marL="914400" indent="0" algn="ctr">
+              <a:buNone/>
+              <a:defRPr sz="1800"/>
+            </a:lvl3pPr>
+            <a:lvl4pPr marL="1371600" indent="0" algn="ctr">
+              <a:buNone/>
+              <a:defRPr sz="1600"/>
+            </a:lvl4pPr>
+            <a:lvl5pPr marL="1828800" indent="0" algn="ctr">
+              <a:buNone/>
+              <a:defRPr sz="1600"/>
+            </a:lvl5pPr>
+            <a:lvl6pPr marL="2286000" indent="0" algn="ctr">
+              <a:buNone/>
+              <a:defRPr sz="1600"/>
+            </a:lvl6pPr>
+            <a:lvl7pPr marL="2743200" indent="0" algn="ctr">
+              <a:buNone/>
+              <a:defRPr sz="1600"/>
+            </a:lvl7pPr>
+            <a:lvl8pPr marL="3200400" indent="0" algn="ctr">
+              <a:buNone/>
+              <a:defRPr sz="1600"/>
+            </a:lvl8pPr>
+            <a:lvl9pPr marL="3657600" indent="0" algn="ctr">
+              <a:buNone/>
+              <a:defRPr sz="1600"/>
+            </a:lvl9pPr>
+          </a:lstStyle>
+          <a:p>
+            <a:pPr lvl="0"/>
+            <a:r>
+              <a:rPr lang="en-US" dirty="0"/>
+              <a:t>Click to add text</a:t>
             </a:r>
           </a:p>
         </p:txBody>
@@ -1925,8 +2462,8 @@
           <p:nvPr userDrawn="1"/>
         </p:nvGrpSpPr>
         <p:grpSpPr>
-          <a:xfrm>
-            <a:off x="8161510" y="2744546"/>
+          <a:xfrm flipH="1">
+            <a:off x="7659974" y="4456458"/>
             <a:ext cx="465456" cy="581432"/>
             <a:chOff x="7843462" y="2744546"/>
             <a:chExt cx="465456" cy="581432"/>
@@ -2375,10 +2912,10 @@
       </p:grpSp>
       <p:pic>
         <p:nvPicPr>
-          <p:cNvPr id="5" name="Picture 4" descr="A film strip on a black background&#10;&#10;Description automatically generated">
+          <p:cNvPr id="6" name="Graphic 5" descr="Film reel with solid fill">
             <a:extLst>
               <a:ext uri="{FF2B5EF4-FFF2-40B4-BE49-F238E27FC236}">
-                <a16:creationId xmlns:a16="http://schemas.microsoft.com/office/drawing/2014/main" id="{3D6EE8A3-3980-BB0F-3879-C92DA39A9B39}"/>
+                <a16:creationId xmlns:a16="http://schemas.microsoft.com/office/drawing/2014/main" id="{3D9E900B-5319-2BAF-A983-ACC597E6872C}"/>
               </a:ext>
             </a:extLst>
           </p:cNvPr>
@@ -2389,7 +2926,11 @@
         </p:nvPicPr>
         <p:blipFill>
           <a:blip r:embed="rId2">
-            <a:alphaModFix amt="20000"/>
+            <a:extLst>
+              <a:ext uri="{96DAC541-7B7A-43D3-8B79-37D633B846F1}">
+                <asvg:svgBlip xmlns:asvg="http://schemas.microsoft.com/office/drawing/2016/SVG/main" r:embed="rId3"/>
+              </a:ext>
+            </a:extLst>
           </a:blip>
           <a:stretch>
             <a:fillRect/>
@@ -2397,40 +2938,8 @@
         </p:blipFill>
         <p:spPr>
           <a:xfrm>
-            <a:off x="-384885" y="-722647"/>
-            <a:ext cx="13150463" cy="2736472"/>
-          </a:xfrm>
-          <a:prstGeom prst="rect">
-            <a:avLst/>
-          </a:prstGeom>
-        </p:spPr>
-      </p:pic>
-      <p:pic>
-        <p:nvPicPr>
-          <p:cNvPr id="6" name="Picture 5" descr="A film strip on a black background&#10;&#10;Description automatically generated">
-            <a:extLst>
-              <a:ext uri="{FF2B5EF4-FFF2-40B4-BE49-F238E27FC236}">
-                <a16:creationId xmlns:a16="http://schemas.microsoft.com/office/drawing/2014/main" id="{FB18170A-1F79-F447-D452-C48F7305CBB7}"/>
-              </a:ext>
-            </a:extLst>
-          </p:cNvPr>
-          <p:cNvPicPr>
-            <a:picLocks noChangeAspect="1"/>
-          </p:cNvPicPr>
-          <p:nvPr userDrawn="1"/>
-        </p:nvPicPr>
-        <p:blipFill>
-          <a:blip r:embed="rId2">
-            <a:alphaModFix amt="20000"/>
-          </a:blip>
-          <a:stretch>
-            <a:fillRect/>
-          </a:stretch>
-        </p:blipFill>
-        <p:spPr>
-          <a:xfrm rot="10800000">
-            <a:off x="-384886" y="5056344"/>
-            <a:ext cx="13150463" cy="2736472"/>
+            <a:off x="11168307" y="0"/>
+            <a:ext cx="914400" cy="914400"/>
           </a:xfrm>
           <a:prstGeom prst="rect">
             <a:avLst/>
@@ -2440,7 +2949,7 @@
     </p:spTree>
     <p:extLst>
       <p:ext uri="{BB962C8B-B14F-4D97-AF65-F5344CB8AC3E}">
-        <p14:creationId xmlns:p14="http://schemas.microsoft.com/office/powerpoint/2010/main" val="2137906023"/>
+        <p14:creationId xmlns:p14="http://schemas.microsoft.com/office/powerpoint/2010/main" val="652645656"/>
       </p:ext>
     </p:extLst>
   </p:cSld>
@@ -5326,9 +5835,25 @@
 </p:sldLayout>
 </file>
 
-<file path=ppt/slideLayouts/slideLayout14.xml><?xml version="1.0" encoding="utf-8"?>
-<p:sldLayout xmlns:a="http://schemas.openxmlformats.org/drawingml/2006/main" xmlns:r="http://schemas.openxmlformats.org/officeDocument/2006/relationships" xmlns:p="http://schemas.openxmlformats.org/presentationml/2006/main" type="titleOnly" preserve="1">
-  <p:cSld name="Title Only">
+<file path=ppt/slideLayouts/slideLayout2.xml><?xml version="1.0" encoding="utf-8"?>
+<p:sldLayout xmlns:a="http://schemas.openxmlformats.org/drawingml/2006/main" xmlns:r="http://schemas.openxmlformats.org/officeDocument/2006/relationships" xmlns:p="http://schemas.openxmlformats.org/presentationml/2006/main" preserve="1" userDrawn="1">
+  <p:cSld name="Title Only Slide">
+    <p:bg>
+      <p:bgPr>
+        <a:gradFill>
+          <a:gsLst>
+            <a:gs pos="100000">
+              <a:schemeClr val="accent4"/>
+            </a:gs>
+            <a:gs pos="0">
+              <a:schemeClr val="accent2"/>
+            </a:gs>
+          </a:gsLst>
+          <a:lin ang="2700000" scaled="1"/>
+        </a:gradFill>
+        <a:effectLst/>
+      </p:bgPr>
+    </p:bg>
     <p:spTree>
       <p:nvGrpSpPr>
         <p:cNvPr id="1" name=""/>
@@ -5348,7 +5873,7 @@
           <p:cNvPr id="2" name="Title 1">
             <a:extLst>
               <a:ext uri="{FF2B5EF4-FFF2-40B4-BE49-F238E27FC236}">
-                <a16:creationId xmlns:a16="http://schemas.microsoft.com/office/drawing/2014/main" id="{E969F227-D21C-48B3-828A-6BFA9585E82F}"/>
+                <a16:creationId xmlns:a16="http://schemas.microsoft.com/office/drawing/2014/main" id="{F6640AAD-80AF-40E7-BE3F-43D32FC68ED4}"/>
               </a:ext>
             </a:extLst>
           </p:cNvPr>
@@ -5356,99 +5881,43 @@
             <a:spLocks noGrp="1"/>
           </p:cNvSpPr>
           <p:nvPr>
-            <p:ph type="title" hasCustomPrompt="1"/>
+            <p:ph type="ctrTitle"/>
           </p:nvPr>
         </p:nvSpPr>
         <p:spPr>
           <a:xfrm>
-            <a:off x="838200" y="136525"/>
-            <a:ext cx="10515600" cy="1509713"/>
+            <a:off x="1280159" y="357809"/>
+            <a:ext cx="7983110" cy="3080335"/>
           </a:xfrm>
         </p:spPr>
         <p:txBody>
-          <a:bodyPr/>
-          <a:lstStyle/>
+          <a:bodyPr lIns="0" tIns="0" rIns="0" bIns="0" anchor="b"/>
+          <a:lstStyle>
+            <a:lvl1pPr algn="l">
+              <a:lnSpc>
+                <a:spcPts val="5400"/>
+              </a:lnSpc>
+              <a:defRPr sz="5400" b="1" i="0" cap="all" spc="0" baseline="0">
+                <a:solidFill>
+                  <a:schemeClr val="bg1"/>
+                </a:solidFill>
+              </a:defRPr>
+            </a:lvl1pPr>
+          </a:lstStyle>
           <a:p>
             <a:r>
               <a:rPr lang="en-US" dirty="0"/>
-              <a:t>Click to add title</a:t>
+              <a:t>Click to edit Master title style</a:t>
             </a:r>
-          </a:p>
-        </p:txBody>
-      </p:sp>
-      <p:sp>
-        <p:nvSpPr>
-          <p:cNvPr id="4" name="Footer Placeholder 3">
-            <a:extLst>
-              <a:ext uri="{FF2B5EF4-FFF2-40B4-BE49-F238E27FC236}">
-                <a16:creationId xmlns:a16="http://schemas.microsoft.com/office/drawing/2014/main" id="{7EBC03C0-6EB7-4633-967C-12C35768BB58}"/>
-              </a:ext>
-            </a:extLst>
-          </p:cNvPr>
-          <p:cNvSpPr>
-            <a:spLocks noGrp="1"/>
-          </p:cNvSpPr>
-          <p:nvPr>
-            <p:ph type="ftr" sz="quarter" idx="11"/>
-          </p:nvPr>
-        </p:nvSpPr>
-        <p:spPr>
-          <a:xfrm>
-            <a:off x="7239000" y="6356350"/>
-            <a:ext cx="4114800" cy="365125"/>
-          </a:xfrm>
-          <a:prstGeom prst="rect">
-            <a:avLst/>
-          </a:prstGeom>
-        </p:spPr>
-        <p:txBody>
-          <a:bodyPr/>
-          <a:lstStyle/>
-          <a:p>
-            <a:endParaRPr lang="en-US" dirty="0"/>
-          </a:p>
-        </p:txBody>
-      </p:sp>
-      <p:sp>
-        <p:nvSpPr>
-          <p:cNvPr id="5" name="Slide Number Placeholder 4">
-            <a:extLst>
-              <a:ext uri="{FF2B5EF4-FFF2-40B4-BE49-F238E27FC236}">
-                <a16:creationId xmlns:a16="http://schemas.microsoft.com/office/drawing/2014/main" id="{30FF4306-91CD-4B7B-8A53-34BE8F997581}"/>
-              </a:ext>
-            </a:extLst>
-          </p:cNvPr>
-          <p:cNvSpPr>
-            <a:spLocks noGrp="1"/>
-          </p:cNvSpPr>
-          <p:nvPr>
-            <p:ph type="sldNum" sz="quarter" idx="12"/>
-          </p:nvPr>
-        </p:nvSpPr>
-        <p:spPr>
-          <a:xfrm>
-            <a:off x="484632" y="726630"/>
-            <a:ext cx="520991" cy="517379"/>
-          </a:xfrm>
-        </p:spPr>
-        <p:txBody>
-          <a:bodyPr/>
-          <a:lstStyle/>
-          <a:p>
-            <a:fld id="{D8DA9DAA-006C-4F4B-980E-E3DF019B24E2}" type="slidenum">
-              <a:rPr lang="en-US" smtClean="0"/>
-              <a:t>‹#›</a:t>
-            </a:fld>
-            <a:endParaRPr lang="en-US" dirty="0"/>
           </a:p>
         </p:txBody>
       </p:sp>
       <p:cxnSp>
         <p:nvCxnSpPr>
-          <p:cNvPr id="3" name="Straight Connector 2">
+          <p:cNvPr id="9" name="Straight Connector 8">
             <a:extLst>
               <a:ext uri="{FF2B5EF4-FFF2-40B4-BE49-F238E27FC236}">
-                <a16:creationId xmlns:a16="http://schemas.microsoft.com/office/drawing/2014/main" id="{B5B2B208-F5B9-0151-C982-A389CB0B2996}"/>
+                <a16:creationId xmlns:a16="http://schemas.microsoft.com/office/drawing/2014/main" id="{8E825845-66DD-4B77-A729-CD97D156FE6C}"/>
               </a:ext>
               <a:ext uri="{C183D7F6-B498-43B3-948B-1728B52AA6E4}">
                 <adec:decorative xmlns:adec="http://schemas.microsoft.com/office/drawing/2017/decorative" val="1"/>
@@ -5462,25 +5931,16 @@
         </p:nvCxnSpPr>
         <p:spPr>
           <a:xfrm>
-            <a:off x="715890" y="1371600"/>
-            <a:ext cx="0" cy="5486400"/>
+            <a:off x="1280160" y="3496322"/>
+            <a:ext cx="0" cy="3352800"/>
           </a:xfrm>
           <a:prstGeom prst="line">
             <a:avLst/>
           </a:prstGeom>
           <a:ln w="25400" cap="sq">
-            <a:gradFill flip="none" rotWithShape="1">
-              <a:gsLst>
-                <a:gs pos="0">
-                  <a:schemeClr val="accent2"/>
-                </a:gs>
-                <a:gs pos="100000">
-                  <a:schemeClr val="accent4"/>
-                </a:gs>
-              </a:gsLst>
-              <a:lin ang="16200000" scaled="1"/>
-              <a:tileRect/>
-            </a:gradFill>
+            <a:solidFill>
+              <a:schemeClr val="bg1"/>
+            </a:solidFill>
             <a:bevel/>
           </a:ln>
         </p:spPr>
@@ -5499,12 +5959,476 @@
           </a:fontRef>
         </p:style>
       </p:cxnSp>
+      <p:grpSp>
+        <p:nvGrpSpPr>
+          <p:cNvPr id="4" name="Group 3">
+            <a:extLst>
+              <a:ext uri="{FF2B5EF4-FFF2-40B4-BE49-F238E27FC236}">
+                <a16:creationId xmlns:a16="http://schemas.microsoft.com/office/drawing/2014/main" id="{22749162-63A5-5BF9-895E-B0577A6C47E0}"/>
+              </a:ext>
+              <a:ext uri="{C183D7F6-B498-43B3-948B-1728B52AA6E4}">
+                <adec:decorative xmlns:adec="http://schemas.microsoft.com/office/drawing/2017/decorative" val="1"/>
+              </a:ext>
+            </a:extLst>
+          </p:cNvPr>
+          <p:cNvGrpSpPr/>
+          <p:nvPr userDrawn="1"/>
+        </p:nvGrpSpPr>
+        <p:grpSpPr>
+          <a:xfrm>
+            <a:off x="8161510" y="2744546"/>
+            <a:ext cx="465456" cy="581432"/>
+            <a:chOff x="7843462" y="2744546"/>
+            <a:chExt cx="465456" cy="581432"/>
+          </a:xfrm>
+        </p:grpSpPr>
+        <p:sp>
+          <p:nvSpPr>
+            <p:cNvPr id="19" name="Graphic 12">
+              <a:extLst>
+                <a:ext uri="{FF2B5EF4-FFF2-40B4-BE49-F238E27FC236}">
+                  <a16:creationId xmlns:a16="http://schemas.microsoft.com/office/drawing/2014/main" id="{818B4386-1FCF-4ACE-BE25-AF9CC5E2256F}"/>
+                </a:ext>
+              </a:extLst>
+            </p:cNvPr>
+            <p:cNvSpPr/>
+            <p:nvPr userDrawn="1"/>
+          </p:nvSpPr>
+          <p:spPr>
+            <a:xfrm>
+              <a:off x="8217780" y="2973840"/>
+              <a:ext cx="91138" cy="91138"/>
+            </a:xfrm>
+            <a:custGeom>
+              <a:avLst/>
+              <a:gdLst>
+                <a:gd name="connsiteX0" fmla="*/ 91138 w 91138"/>
+                <a:gd name="connsiteY0" fmla="*/ 45569 h 91138"/>
+                <a:gd name="connsiteX1" fmla="*/ 45569 w 91138"/>
+                <a:gd name="connsiteY1" fmla="*/ 91138 h 91138"/>
+                <a:gd name="connsiteX2" fmla="*/ 0 w 91138"/>
+                <a:gd name="connsiteY2" fmla="*/ 45569 h 91138"/>
+                <a:gd name="connsiteX3" fmla="*/ 45569 w 91138"/>
+                <a:gd name="connsiteY3" fmla="*/ 0 h 91138"/>
+                <a:gd name="connsiteX4" fmla="*/ 91138 w 91138"/>
+                <a:gd name="connsiteY4" fmla="*/ 45569 h 91138"/>
+              </a:gdLst>
+              <a:ahLst/>
+              <a:cxnLst>
+                <a:cxn ang="0">
+                  <a:pos x="connsiteX0" y="connsiteY0"/>
+                </a:cxn>
+                <a:cxn ang="0">
+                  <a:pos x="connsiteX1" y="connsiteY1"/>
+                </a:cxn>
+                <a:cxn ang="0">
+                  <a:pos x="connsiteX2" y="connsiteY2"/>
+                </a:cxn>
+                <a:cxn ang="0">
+                  <a:pos x="connsiteX3" y="connsiteY3"/>
+                </a:cxn>
+                <a:cxn ang="0">
+                  <a:pos x="connsiteX4" y="connsiteY4"/>
+                </a:cxn>
+              </a:cxnLst>
+              <a:rect l="l" t="t" r="r" b="b"/>
+              <a:pathLst>
+                <a:path w="91138" h="91138">
+                  <a:moveTo>
+                    <a:pt x="91138" y="45569"/>
+                  </a:moveTo>
+                  <a:cubicBezTo>
+                    <a:pt x="91138" y="70736"/>
+                    <a:pt x="70736" y="91138"/>
+                    <a:pt x="45569" y="91138"/>
+                  </a:cubicBezTo>
+                  <a:cubicBezTo>
+                    <a:pt x="20402" y="91138"/>
+                    <a:pt x="0" y="70736"/>
+                    <a:pt x="0" y="45569"/>
+                  </a:cubicBezTo>
+                  <a:cubicBezTo>
+                    <a:pt x="0" y="20402"/>
+                    <a:pt x="20402" y="0"/>
+                    <a:pt x="45569" y="0"/>
+                  </a:cubicBezTo>
+                  <a:cubicBezTo>
+                    <a:pt x="70736" y="0"/>
+                    <a:pt x="91138" y="20402"/>
+                    <a:pt x="91138" y="45569"/>
+                  </a:cubicBezTo>
+                  <a:close/>
+                </a:path>
+              </a:pathLst>
+            </a:custGeom>
+            <a:solidFill>
+              <a:schemeClr val="bg1"/>
+            </a:solidFill>
+            <a:ln w="422" cap="flat">
+              <a:noFill/>
+              <a:prstDash val="solid"/>
+              <a:miter/>
+            </a:ln>
+          </p:spPr>
+          <p:txBody>
+            <a:bodyPr rtlCol="0" anchor="ctr"/>
+            <a:lstStyle/>
+            <a:p>
+              <a:endParaRPr lang="en-US" dirty="0"/>
+            </a:p>
+          </p:txBody>
+        </p:sp>
+        <p:sp>
+          <p:nvSpPr>
+            <p:cNvPr id="21" name="Graphic 13">
+              <a:extLst>
+                <a:ext uri="{FF2B5EF4-FFF2-40B4-BE49-F238E27FC236}">
+                  <a16:creationId xmlns:a16="http://schemas.microsoft.com/office/drawing/2014/main" id="{19319560-50ED-4963-A2CF-74663239D426}"/>
+                </a:ext>
+              </a:extLst>
+            </p:cNvPr>
+            <p:cNvSpPr/>
+            <p:nvPr userDrawn="1"/>
+          </p:nvSpPr>
+          <p:spPr>
+            <a:xfrm>
+              <a:off x="7859002" y="2744546"/>
+              <a:ext cx="139038" cy="139038"/>
+            </a:xfrm>
+            <a:custGeom>
+              <a:avLst/>
+              <a:gdLst>
+                <a:gd name="connsiteX0" fmla="*/ 129601 w 139038"/>
+                <a:gd name="connsiteY0" fmla="*/ 60082 h 139038"/>
+                <a:gd name="connsiteX1" fmla="*/ 78956 w 139038"/>
+                <a:gd name="connsiteY1" fmla="*/ 60082 h 139038"/>
+                <a:gd name="connsiteX2" fmla="*/ 78956 w 139038"/>
+                <a:gd name="connsiteY2" fmla="*/ 9437 h 139038"/>
+                <a:gd name="connsiteX3" fmla="*/ 69519 w 139038"/>
+                <a:gd name="connsiteY3" fmla="*/ 0 h 139038"/>
+                <a:gd name="connsiteX4" fmla="*/ 60082 w 139038"/>
+                <a:gd name="connsiteY4" fmla="*/ 9437 h 139038"/>
+                <a:gd name="connsiteX5" fmla="*/ 60082 w 139038"/>
+                <a:gd name="connsiteY5" fmla="*/ 60082 h 139038"/>
+                <a:gd name="connsiteX6" fmla="*/ 9437 w 139038"/>
+                <a:gd name="connsiteY6" fmla="*/ 60082 h 139038"/>
+                <a:gd name="connsiteX7" fmla="*/ 0 w 139038"/>
+                <a:gd name="connsiteY7" fmla="*/ 69519 h 139038"/>
+                <a:gd name="connsiteX8" fmla="*/ 9437 w 139038"/>
+                <a:gd name="connsiteY8" fmla="*/ 78956 h 139038"/>
+                <a:gd name="connsiteX9" fmla="*/ 60082 w 139038"/>
+                <a:gd name="connsiteY9" fmla="*/ 78956 h 139038"/>
+                <a:gd name="connsiteX10" fmla="*/ 60082 w 139038"/>
+                <a:gd name="connsiteY10" fmla="*/ 129601 h 139038"/>
+                <a:gd name="connsiteX11" fmla="*/ 69519 w 139038"/>
+                <a:gd name="connsiteY11" fmla="*/ 139038 h 139038"/>
+                <a:gd name="connsiteX12" fmla="*/ 78956 w 139038"/>
+                <a:gd name="connsiteY12" fmla="*/ 129601 h 139038"/>
+                <a:gd name="connsiteX13" fmla="*/ 78956 w 139038"/>
+                <a:gd name="connsiteY13" fmla="*/ 78956 h 139038"/>
+                <a:gd name="connsiteX14" fmla="*/ 129601 w 139038"/>
+                <a:gd name="connsiteY14" fmla="*/ 78956 h 139038"/>
+                <a:gd name="connsiteX15" fmla="*/ 139038 w 139038"/>
+                <a:gd name="connsiteY15" fmla="*/ 69519 h 139038"/>
+                <a:gd name="connsiteX16" fmla="*/ 129601 w 139038"/>
+                <a:gd name="connsiteY16" fmla="*/ 60082 h 139038"/>
+              </a:gdLst>
+              <a:ahLst/>
+              <a:cxnLst>
+                <a:cxn ang="0">
+                  <a:pos x="connsiteX0" y="connsiteY0"/>
+                </a:cxn>
+                <a:cxn ang="0">
+                  <a:pos x="connsiteX1" y="connsiteY1"/>
+                </a:cxn>
+                <a:cxn ang="0">
+                  <a:pos x="connsiteX2" y="connsiteY2"/>
+                </a:cxn>
+                <a:cxn ang="0">
+                  <a:pos x="connsiteX3" y="connsiteY3"/>
+                </a:cxn>
+                <a:cxn ang="0">
+                  <a:pos x="connsiteX4" y="connsiteY4"/>
+                </a:cxn>
+                <a:cxn ang="0">
+                  <a:pos x="connsiteX5" y="connsiteY5"/>
+                </a:cxn>
+                <a:cxn ang="0">
+                  <a:pos x="connsiteX6" y="connsiteY6"/>
+                </a:cxn>
+                <a:cxn ang="0">
+                  <a:pos x="connsiteX7" y="connsiteY7"/>
+                </a:cxn>
+                <a:cxn ang="0">
+                  <a:pos x="connsiteX8" y="connsiteY8"/>
+                </a:cxn>
+                <a:cxn ang="0">
+                  <a:pos x="connsiteX9" y="connsiteY9"/>
+                </a:cxn>
+                <a:cxn ang="0">
+                  <a:pos x="connsiteX10" y="connsiteY10"/>
+                </a:cxn>
+                <a:cxn ang="0">
+                  <a:pos x="connsiteX11" y="connsiteY11"/>
+                </a:cxn>
+                <a:cxn ang="0">
+                  <a:pos x="connsiteX12" y="connsiteY12"/>
+                </a:cxn>
+                <a:cxn ang="0">
+                  <a:pos x="connsiteX13" y="connsiteY13"/>
+                </a:cxn>
+                <a:cxn ang="0">
+                  <a:pos x="connsiteX14" y="connsiteY14"/>
+                </a:cxn>
+                <a:cxn ang="0">
+                  <a:pos x="connsiteX15" y="connsiteY15"/>
+                </a:cxn>
+                <a:cxn ang="0">
+                  <a:pos x="connsiteX16" y="connsiteY16"/>
+                </a:cxn>
+              </a:cxnLst>
+              <a:rect l="l" t="t" r="r" b="b"/>
+              <a:pathLst>
+                <a:path w="139038" h="139038">
+                  <a:moveTo>
+                    <a:pt x="129601" y="60082"/>
+                  </a:moveTo>
+                  <a:lnTo>
+                    <a:pt x="78956" y="60082"/>
+                  </a:lnTo>
+                  <a:lnTo>
+                    <a:pt x="78956" y="9437"/>
+                  </a:lnTo>
+                  <a:cubicBezTo>
+                    <a:pt x="78956" y="4225"/>
+                    <a:pt x="74731" y="0"/>
+                    <a:pt x="69519" y="0"/>
+                  </a:cubicBezTo>
+                  <a:cubicBezTo>
+                    <a:pt x="64307" y="0"/>
+                    <a:pt x="60082" y="4225"/>
+                    <a:pt x="60082" y="9437"/>
+                  </a:cubicBezTo>
+                  <a:lnTo>
+                    <a:pt x="60082" y="60082"/>
+                  </a:lnTo>
+                  <a:lnTo>
+                    <a:pt x="9437" y="60082"/>
+                  </a:lnTo>
+                  <a:cubicBezTo>
+                    <a:pt x="4225" y="60082"/>
+                    <a:pt x="0" y="64307"/>
+                    <a:pt x="0" y="69519"/>
+                  </a:cubicBezTo>
+                  <a:cubicBezTo>
+                    <a:pt x="0" y="74731"/>
+                    <a:pt x="4225" y="78956"/>
+                    <a:pt x="9437" y="78956"/>
+                  </a:cubicBezTo>
+                  <a:lnTo>
+                    <a:pt x="60082" y="78956"/>
+                  </a:lnTo>
+                  <a:lnTo>
+                    <a:pt x="60082" y="129601"/>
+                  </a:lnTo>
+                  <a:cubicBezTo>
+                    <a:pt x="60082" y="134813"/>
+                    <a:pt x="64307" y="139038"/>
+                    <a:pt x="69519" y="139038"/>
+                  </a:cubicBezTo>
+                  <a:cubicBezTo>
+                    <a:pt x="74731" y="139038"/>
+                    <a:pt x="78956" y="134813"/>
+                    <a:pt x="78956" y="129601"/>
+                  </a:cubicBezTo>
+                  <a:lnTo>
+                    <a:pt x="78956" y="78956"/>
+                  </a:lnTo>
+                  <a:lnTo>
+                    <a:pt x="129601" y="78956"/>
+                  </a:lnTo>
+                  <a:cubicBezTo>
+                    <a:pt x="134813" y="78956"/>
+                    <a:pt x="139038" y="74731"/>
+                    <a:pt x="139038" y="69519"/>
+                  </a:cubicBezTo>
+                  <a:cubicBezTo>
+                    <a:pt x="139038" y="64307"/>
+                    <a:pt x="134813" y="60082"/>
+                    <a:pt x="129601" y="60082"/>
+                  </a:cubicBezTo>
+                  <a:close/>
+                </a:path>
+              </a:pathLst>
+            </a:custGeom>
+            <a:solidFill>
+              <a:schemeClr val="bg1"/>
+            </a:solidFill>
+            <a:ln w="603" cap="flat">
+              <a:noFill/>
+              <a:prstDash val="solid"/>
+              <a:miter/>
+            </a:ln>
+          </p:spPr>
+          <p:txBody>
+            <a:bodyPr rtlCol="0" anchor="ctr"/>
+            <a:lstStyle/>
+            <a:p>
+              <a:endParaRPr lang="en-US" dirty="0"/>
+            </a:p>
+          </p:txBody>
+        </p:sp>
+        <p:sp>
+          <p:nvSpPr>
+            <p:cNvPr id="23" name="Graphic 15">
+              <a:extLst>
+                <a:ext uri="{FF2B5EF4-FFF2-40B4-BE49-F238E27FC236}">
+                  <a16:creationId xmlns:a16="http://schemas.microsoft.com/office/drawing/2014/main" id="{E5ABBDAD-943D-48F3-9C80-B29C48966C79}"/>
+                </a:ext>
+              </a:extLst>
+            </p:cNvPr>
+            <p:cNvSpPr/>
+            <p:nvPr userDrawn="1"/>
+          </p:nvSpPr>
+          <p:spPr>
+            <a:xfrm>
+              <a:off x="7843462" y="3198265"/>
+              <a:ext cx="127713" cy="127713"/>
+            </a:xfrm>
+            <a:custGeom>
+              <a:avLst/>
+              <a:gdLst>
+                <a:gd name="connsiteX0" fmla="*/ 63857 w 127713"/>
+                <a:gd name="connsiteY0" fmla="*/ 18874 h 127713"/>
+                <a:gd name="connsiteX1" fmla="*/ 108839 w 127713"/>
+                <a:gd name="connsiteY1" fmla="*/ 63857 h 127713"/>
+                <a:gd name="connsiteX2" fmla="*/ 63857 w 127713"/>
+                <a:gd name="connsiteY2" fmla="*/ 108839 h 127713"/>
+                <a:gd name="connsiteX3" fmla="*/ 18874 w 127713"/>
+                <a:gd name="connsiteY3" fmla="*/ 63857 h 127713"/>
+                <a:gd name="connsiteX4" fmla="*/ 63857 w 127713"/>
+                <a:gd name="connsiteY4" fmla="*/ 18874 h 127713"/>
+                <a:gd name="connsiteX5" fmla="*/ 63857 w 127713"/>
+                <a:gd name="connsiteY5" fmla="*/ 0 h 127713"/>
+                <a:gd name="connsiteX6" fmla="*/ 0 w 127713"/>
+                <a:gd name="connsiteY6" fmla="*/ 63857 h 127713"/>
+                <a:gd name="connsiteX7" fmla="*/ 63857 w 127713"/>
+                <a:gd name="connsiteY7" fmla="*/ 127713 h 127713"/>
+                <a:gd name="connsiteX8" fmla="*/ 127713 w 127713"/>
+                <a:gd name="connsiteY8" fmla="*/ 63857 h 127713"/>
+                <a:gd name="connsiteX9" fmla="*/ 63857 w 127713"/>
+                <a:gd name="connsiteY9" fmla="*/ 0 h 127713"/>
+              </a:gdLst>
+              <a:ahLst/>
+              <a:cxnLst>
+                <a:cxn ang="0">
+                  <a:pos x="connsiteX0" y="connsiteY0"/>
+                </a:cxn>
+                <a:cxn ang="0">
+                  <a:pos x="connsiteX1" y="connsiteY1"/>
+                </a:cxn>
+                <a:cxn ang="0">
+                  <a:pos x="connsiteX2" y="connsiteY2"/>
+                </a:cxn>
+                <a:cxn ang="0">
+                  <a:pos x="connsiteX3" y="connsiteY3"/>
+                </a:cxn>
+                <a:cxn ang="0">
+                  <a:pos x="connsiteX4" y="connsiteY4"/>
+                </a:cxn>
+                <a:cxn ang="0">
+                  <a:pos x="connsiteX5" y="connsiteY5"/>
+                </a:cxn>
+                <a:cxn ang="0">
+                  <a:pos x="connsiteX6" y="connsiteY6"/>
+                </a:cxn>
+                <a:cxn ang="0">
+                  <a:pos x="connsiteX7" y="connsiteY7"/>
+                </a:cxn>
+                <a:cxn ang="0">
+                  <a:pos x="connsiteX8" y="connsiteY8"/>
+                </a:cxn>
+                <a:cxn ang="0">
+                  <a:pos x="connsiteX9" y="connsiteY9"/>
+                </a:cxn>
+              </a:cxnLst>
+              <a:rect l="l" t="t" r="r" b="b"/>
+              <a:pathLst>
+                <a:path w="127713" h="127713">
+                  <a:moveTo>
+                    <a:pt x="63857" y="18874"/>
+                  </a:moveTo>
+                  <a:cubicBezTo>
+                    <a:pt x="88700" y="18874"/>
+                    <a:pt x="108839" y="39013"/>
+                    <a:pt x="108839" y="63857"/>
+                  </a:cubicBezTo>
+                  <a:cubicBezTo>
+                    <a:pt x="108839" y="88700"/>
+                    <a:pt x="88700" y="108839"/>
+                    <a:pt x="63857" y="108839"/>
+                  </a:cubicBezTo>
+                  <a:cubicBezTo>
+                    <a:pt x="39013" y="108839"/>
+                    <a:pt x="18874" y="88700"/>
+                    <a:pt x="18874" y="63857"/>
+                  </a:cubicBezTo>
+                  <a:cubicBezTo>
+                    <a:pt x="18898" y="39023"/>
+                    <a:pt x="39023" y="18898"/>
+                    <a:pt x="63857" y="18874"/>
+                  </a:cubicBezTo>
+                  <a:moveTo>
+                    <a:pt x="63857" y="0"/>
+                  </a:moveTo>
+                  <a:cubicBezTo>
+                    <a:pt x="28590" y="0"/>
+                    <a:pt x="0" y="28590"/>
+                    <a:pt x="0" y="63857"/>
+                  </a:cubicBezTo>
+                  <a:cubicBezTo>
+                    <a:pt x="0" y="99124"/>
+                    <a:pt x="28590" y="127713"/>
+                    <a:pt x="63857" y="127713"/>
+                  </a:cubicBezTo>
+                  <a:cubicBezTo>
+                    <a:pt x="99124" y="127713"/>
+                    <a:pt x="127713" y="99124"/>
+                    <a:pt x="127713" y="63857"/>
+                  </a:cubicBezTo>
+                  <a:cubicBezTo>
+                    <a:pt x="127713" y="28590"/>
+                    <a:pt x="99124" y="0"/>
+                    <a:pt x="63857" y="0"/>
+                  </a:cubicBezTo>
+                  <a:close/>
+                </a:path>
+              </a:pathLst>
+            </a:custGeom>
+            <a:solidFill>
+              <a:schemeClr val="bg1"/>
+            </a:solidFill>
+            <a:ln w="610" cap="flat">
+              <a:noFill/>
+              <a:prstDash val="solid"/>
+              <a:miter/>
+            </a:ln>
+          </p:spPr>
+          <p:txBody>
+            <a:bodyPr rtlCol="0" anchor="ctr"/>
+            <a:lstStyle/>
+            <a:p>
+              <a:endParaRPr lang="en-US" dirty="0"/>
+            </a:p>
+          </p:txBody>
+        </p:sp>
+      </p:grpSp>
       <p:pic>
         <p:nvPicPr>
-          <p:cNvPr id="7" name="Graphic 6" descr="Film reel with solid fill">
+          <p:cNvPr id="5" name="Picture 4" descr="A film strip on a black background&#10;&#10;Description automatically generated">
             <a:extLst>
               <a:ext uri="{FF2B5EF4-FFF2-40B4-BE49-F238E27FC236}">
-                <a16:creationId xmlns:a16="http://schemas.microsoft.com/office/drawing/2014/main" id="{D4272C7C-40E2-13AD-8E86-53B9E4C11CDA}"/>
+                <a16:creationId xmlns:a16="http://schemas.microsoft.com/office/drawing/2014/main" id="{3D6EE8A3-3980-BB0F-3879-C92DA39A9B39}"/>
               </a:ext>
             </a:extLst>
           </p:cNvPr>
@@ -5515,11 +6439,7 @@
         </p:nvPicPr>
         <p:blipFill>
           <a:blip r:embed="rId2">
-            <a:extLst>
-              <a:ext uri="{96DAC541-7B7A-43D3-8B79-37D633B846F1}">
-                <asvg:svgBlip xmlns:asvg="http://schemas.microsoft.com/office/drawing/2016/SVG/main" r:embed="rId3"/>
-              </a:ext>
-            </a:extLst>
+            <a:alphaModFix amt="20000"/>
           </a:blip>
           <a:stretch>
             <a:fillRect/>
@@ -5527,18 +6447,326 @@
         </p:blipFill>
         <p:spPr>
           <a:xfrm>
-            <a:off x="11168307" y="0"/>
-            <a:ext cx="914400" cy="914400"/>
+            <a:off x="-384885" y="-722647"/>
+            <a:ext cx="13150463" cy="2736472"/>
           </a:xfrm>
           <a:prstGeom prst="rect">
             <a:avLst/>
           </a:prstGeom>
         </p:spPr>
       </p:pic>
+      <p:pic>
+        <p:nvPicPr>
+          <p:cNvPr id="6" name="Picture 5" descr="A film strip on a black background&#10;&#10;Description automatically generated">
+            <a:extLst>
+              <a:ext uri="{FF2B5EF4-FFF2-40B4-BE49-F238E27FC236}">
+                <a16:creationId xmlns:a16="http://schemas.microsoft.com/office/drawing/2014/main" id="{FB18170A-1F79-F447-D452-C48F7305CBB7}"/>
+              </a:ext>
+            </a:extLst>
+          </p:cNvPr>
+          <p:cNvPicPr>
+            <a:picLocks noChangeAspect="1"/>
+          </p:cNvPicPr>
+          <p:nvPr userDrawn="1"/>
+        </p:nvPicPr>
+        <p:blipFill>
+          <a:blip r:embed="rId2">
+            <a:alphaModFix amt="20000"/>
+          </a:blip>
+          <a:stretch>
+            <a:fillRect/>
+          </a:stretch>
+        </p:blipFill>
+        <p:spPr>
+          <a:xfrm rot="10800000">
+            <a:off x="-384886" y="5056344"/>
+            <a:ext cx="13150463" cy="2736472"/>
+          </a:xfrm>
+          <a:prstGeom prst="rect">
+            <a:avLst/>
+          </a:prstGeom>
+        </p:spPr>
+      </p:pic>
+      <p:sp>
+        <p:nvSpPr>
+          <p:cNvPr id="3" name="Subtitle 2">
+            <a:extLst>
+              <a:ext uri="{FF2B5EF4-FFF2-40B4-BE49-F238E27FC236}">
+                <a16:creationId xmlns:a16="http://schemas.microsoft.com/office/drawing/2014/main" id="{8F93B8C3-8989-63CE-F5E2-8EA9998EA6F3}"/>
+              </a:ext>
+            </a:extLst>
+          </p:cNvPr>
+          <p:cNvSpPr>
+            <a:spLocks noGrp="1"/>
+          </p:cNvSpPr>
+          <p:nvPr>
+            <p:ph type="subTitle" idx="1" hasCustomPrompt="1"/>
+          </p:nvPr>
+        </p:nvSpPr>
+        <p:spPr>
+          <a:xfrm>
+            <a:off x="1344875" y="3549688"/>
+            <a:ext cx="7853678" cy="726645"/>
+          </a:xfrm>
+        </p:spPr>
+        <p:txBody>
+          <a:bodyPr lIns="0" tIns="0" rIns="0" bIns="0" anchor="t" anchorCtr="0">
+            <a:normAutofit/>
+          </a:bodyPr>
+          <a:lstStyle>
+            <a:lvl1pPr marL="0" indent="0" algn="l">
+              <a:buNone/>
+              <a:defRPr sz="2400">
+                <a:solidFill>
+                  <a:schemeClr val="bg1"/>
+                </a:solidFill>
+              </a:defRPr>
+            </a:lvl1pPr>
+            <a:lvl2pPr marL="457200" indent="0" algn="ctr">
+              <a:buNone/>
+              <a:defRPr sz="2000"/>
+            </a:lvl2pPr>
+            <a:lvl3pPr marL="914400" indent="0" algn="ctr">
+              <a:buNone/>
+              <a:defRPr sz="1800"/>
+            </a:lvl3pPr>
+            <a:lvl4pPr marL="1371600" indent="0" algn="ctr">
+              <a:buNone/>
+              <a:defRPr sz="1600"/>
+            </a:lvl4pPr>
+            <a:lvl5pPr marL="1828800" indent="0" algn="ctr">
+              <a:buNone/>
+              <a:defRPr sz="1600"/>
+            </a:lvl5pPr>
+            <a:lvl6pPr marL="2286000" indent="0" algn="ctr">
+              <a:buNone/>
+              <a:defRPr sz="1600"/>
+            </a:lvl6pPr>
+            <a:lvl7pPr marL="2743200" indent="0" algn="ctr">
+              <a:buNone/>
+              <a:defRPr sz="1600"/>
+            </a:lvl7pPr>
+            <a:lvl8pPr marL="3200400" indent="0" algn="ctr">
+              <a:buNone/>
+              <a:defRPr sz="1600"/>
+            </a:lvl8pPr>
+            <a:lvl9pPr marL="3657600" indent="0" algn="ctr">
+              <a:buNone/>
+              <a:defRPr sz="1600"/>
+            </a:lvl9pPr>
+          </a:lstStyle>
+          <a:p>
+            <a:pPr lvl="0"/>
+            <a:r>
+              <a:rPr lang="en-US" dirty="0"/>
+              <a:t>[AUTHORS]</a:t>
+            </a:r>
+          </a:p>
+        </p:txBody>
+      </p:sp>
+      <p:sp>
+        <p:nvSpPr>
+          <p:cNvPr id="7" name="Subtitle 2">
+            <a:extLst>
+              <a:ext uri="{FF2B5EF4-FFF2-40B4-BE49-F238E27FC236}">
+                <a16:creationId xmlns:a16="http://schemas.microsoft.com/office/drawing/2014/main" id="{6E17C876-2BA0-BA1E-D5BA-625CFA8D5FDD}"/>
+              </a:ext>
+            </a:extLst>
+          </p:cNvPr>
+          <p:cNvSpPr txBox="1">
+            <a:spLocks/>
+          </p:cNvSpPr>
+          <p:nvPr userDrawn="1"/>
+        </p:nvSpPr>
+        <p:spPr>
+          <a:xfrm>
+            <a:off x="133002" y="6425467"/>
+            <a:ext cx="7853678" cy="726645"/>
+          </a:xfrm>
+          <a:prstGeom prst="rect">
+            <a:avLst/>
+          </a:prstGeom>
+        </p:spPr>
+        <p:txBody>
+          <a:bodyPr vert="horz" lIns="0" tIns="0" rIns="0" bIns="0" rtlCol="0" anchor="t" anchorCtr="0">
+            <a:normAutofit/>
+          </a:bodyPr>
+          <a:lstStyle>
+            <a:lvl1pPr marL="0" indent="0" algn="l" defTabSz="914400" rtl="0" eaLnBrk="1" latinLnBrk="0" hangingPunct="1">
+              <a:lnSpc>
+                <a:spcPct val="90000"/>
+              </a:lnSpc>
+              <a:spcBef>
+                <a:spcPts val="1000"/>
+              </a:spcBef>
+              <a:buFont typeface="Arial" panose="020B0604020202020204" pitchFamily="34" charset="0"/>
+              <a:buNone/>
+              <a:defRPr sz="2400" kern="1200">
+                <a:solidFill>
+                  <a:schemeClr val="bg1"/>
+                </a:solidFill>
+                <a:latin typeface="+mn-lt"/>
+                <a:ea typeface="+mn-ea"/>
+                <a:cs typeface="+mn-cs"/>
+              </a:defRPr>
+            </a:lvl1pPr>
+            <a:lvl2pPr marL="457200" indent="0" algn="ctr" defTabSz="914400" rtl="0" eaLnBrk="1" latinLnBrk="0" hangingPunct="1">
+              <a:lnSpc>
+                <a:spcPct val="90000"/>
+              </a:lnSpc>
+              <a:spcBef>
+                <a:spcPts val="500"/>
+              </a:spcBef>
+              <a:buFont typeface="Arial" panose="020B0604020202020204" pitchFamily="34" charset="0"/>
+              <a:buNone/>
+              <a:defRPr sz="2000" kern="1200">
+                <a:solidFill>
+                  <a:schemeClr val="tx1"/>
+                </a:solidFill>
+                <a:latin typeface="+mn-lt"/>
+                <a:ea typeface="+mn-ea"/>
+                <a:cs typeface="+mn-cs"/>
+              </a:defRPr>
+            </a:lvl2pPr>
+            <a:lvl3pPr marL="914400" indent="0" algn="ctr" defTabSz="914400" rtl="0" eaLnBrk="1" latinLnBrk="0" hangingPunct="1">
+              <a:lnSpc>
+                <a:spcPct val="90000"/>
+              </a:lnSpc>
+              <a:spcBef>
+                <a:spcPts val="500"/>
+              </a:spcBef>
+              <a:buFont typeface="Arial" panose="020B0604020202020204" pitchFamily="34" charset="0"/>
+              <a:buNone/>
+              <a:defRPr sz="1800" kern="1200">
+                <a:solidFill>
+                  <a:schemeClr val="tx1"/>
+                </a:solidFill>
+                <a:latin typeface="+mn-lt"/>
+                <a:ea typeface="+mn-ea"/>
+                <a:cs typeface="+mn-cs"/>
+              </a:defRPr>
+            </a:lvl3pPr>
+            <a:lvl4pPr marL="1371600" indent="0" algn="ctr" defTabSz="914400" rtl="0" eaLnBrk="1" latinLnBrk="0" hangingPunct="1">
+              <a:lnSpc>
+                <a:spcPct val="90000"/>
+              </a:lnSpc>
+              <a:spcBef>
+                <a:spcPts val="500"/>
+              </a:spcBef>
+              <a:buFont typeface="Arial" panose="020B0604020202020204" pitchFamily="34" charset="0"/>
+              <a:buNone/>
+              <a:defRPr sz="1600" kern="1200">
+                <a:solidFill>
+                  <a:schemeClr val="tx1"/>
+                </a:solidFill>
+                <a:latin typeface="+mn-lt"/>
+                <a:ea typeface="+mn-ea"/>
+                <a:cs typeface="+mn-cs"/>
+              </a:defRPr>
+            </a:lvl4pPr>
+            <a:lvl5pPr marL="1828800" indent="0" algn="ctr" defTabSz="914400" rtl="0" eaLnBrk="1" latinLnBrk="0" hangingPunct="1">
+              <a:lnSpc>
+                <a:spcPct val="90000"/>
+              </a:lnSpc>
+              <a:spcBef>
+                <a:spcPts val="500"/>
+              </a:spcBef>
+              <a:buFont typeface="Arial" panose="020B0604020202020204" pitchFamily="34" charset="0"/>
+              <a:buNone/>
+              <a:defRPr sz="1600" kern="1200">
+                <a:solidFill>
+                  <a:schemeClr val="tx1"/>
+                </a:solidFill>
+                <a:latin typeface="+mn-lt"/>
+                <a:ea typeface="+mn-ea"/>
+                <a:cs typeface="+mn-cs"/>
+              </a:defRPr>
+            </a:lvl5pPr>
+            <a:lvl6pPr marL="2286000" indent="0" algn="ctr" defTabSz="914400" rtl="0" eaLnBrk="1" latinLnBrk="0" hangingPunct="1">
+              <a:lnSpc>
+                <a:spcPct val="90000"/>
+              </a:lnSpc>
+              <a:spcBef>
+                <a:spcPts val="500"/>
+              </a:spcBef>
+              <a:buFont typeface="Arial" panose="020B0604020202020204" pitchFamily="34" charset="0"/>
+              <a:buNone/>
+              <a:defRPr sz="1600" kern="1200">
+                <a:solidFill>
+                  <a:schemeClr val="tx1"/>
+                </a:solidFill>
+                <a:latin typeface="+mn-lt"/>
+                <a:ea typeface="+mn-ea"/>
+                <a:cs typeface="+mn-cs"/>
+              </a:defRPr>
+            </a:lvl6pPr>
+            <a:lvl7pPr marL="2743200" indent="0" algn="ctr" defTabSz="914400" rtl="0" eaLnBrk="1" latinLnBrk="0" hangingPunct="1">
+              <a:lnSpc>
+                <a:spcPct val="90000"/>
+              </a:lnSpc>
+              <a:spcBef>
+                <a:spcPts val="500"/>
+              </a:spcBef>
+              <a:buFont typeface="Arial" panose="020B0604020202020204" pitchFamily="34" charset="0"/>
+              <a:buNone/>
+              <a:defRPr sz="1600" kern="1200">
+                <a:solidFill>
+                  <a:schemeClr val="tx1"/>
+                </a:solidFill>
+                <a:latin typeface="+mn-lt"/>
+                <a:ea typeface="+mn-ea"/>
+                <a:cs typeface="+mn-cs"/>
+              </a:defRPr>
+            </a:lvl7pPr>
+            <a:lvl8pPr marL="3200400" indent="0" algn="ctr" defTabSz="914400" rtl="0" eaLnBrk="1" latinLnBrk="0" hangingPunct="1">
+              <a:lnSpc>
+                <a:spcPct val="90000"/>
+              </a:lnSpc>
+              <a:spcBef>
+                <a:spcPts val="500"/>
+              </a:spcBef>
+              <a:buFont typeface="Arial" panose="020B0604020202020204" pitchFamily="34" charset="0"/>
+              <a:buNone/>
+              <a:defRPr sz="1600" kern="1200">
+                <a:solidFill>
+                  <a:schemeClr val="tx1"/>
+                </a:solidFill>
+                <a:latin typeface="+mn-lt"/>
+                <a:ea typeface="+mn-ea"/>
+                <a:cs typeface="+mn-cs"/>
+              </a:defRPr>
+            </a:lvl8pPr>
+            <a:lvl9pPr marL="3657600" indent="0" algn="ctr" defTabSz="914400" rtl="0" eaLnBrk="1" latinLnBrk="0" hangingPunct="1">
+              <a:lnSpc>
+                <a:spcPct val="90000"/>
+              </a:lnSpc>
+              <a:spcBef>
+                <a:spcPts val="500"/>
+              </a:spcBef>
+              <a:buFont typeface="Arial" panose="020B0604020202020204" pitchFamily="34" charset="0"/>
+              <a:buNone/>
+              <a:defRPr sz="1600" kern="1200">
+                <a:solidFill>
+                  <a:schemeClr val="tx1"/>
+                </a:solidFill>
+                <a:latin typeface="+mn-lt"/>
+                <a:ea typeface="+mn-ea"/>
+                <a:cs typeface="+mn-cs"/>
+              </a:defRPr>
+            </a:lvl9pPr>
+          </a:lstStyle>
+          <a:p>
+            <a:r>
+              <a:rPr lang="en-US" dirty="0"/>
+              <a:t>[Date]</a:t>
+            </a:r>
+          </a:p>
+        </p:txBody>
+      </p:sp>
     </p:spTree>
     <p:extLst>
       <p:ext uri="{BB962C8B-B14F-4D97-AF65-F5344CB8AC3E}">
-        <p14:creationId xmlns:p14="http://schemas.microsoft.com/office/powerpoint/2010/main" val="1663291002"/>
+        <p14:creationId xmlns:p14="http://schemas.microsoft.com/office/powerpoint/2010/main" val="2137906023"/>
       </p:ext>
     </p:extLst>
   </p:cSld>
@@ -5548,7 +6776,7 @@
 </p:sldLayout>
 </file>
 
-<file path=ppt/slideLayouts/slideLayout2.xml><?xml version="1.0" encoding="utf-8"?>
+<file path=ppt/slideLayouts/slideLayout3.xml><?xml version="1.0" encoding="utf-8"?>
 <p:sldLayout xmlns:a="http://schemas.openxmlformats.org/drawingml/2006/main" xmlns:r="http://schemas.openxmlformats.org/officeDocument/2006/relationships" xmlns:p="http://schemas.openxmlformats.org/presentationml/2006/main" preserve="1" userDrawn="1">
   <p:cSld name="Title and image">
     <p:bg>
@@ -6318,7 +7546,7 @@
 </p:sldLayout>
 </file>
 
-<file path=ppt/slideLayouts/slideLayout3.xml><?xml version="1.0" encoding="utf-8"?>
+<file path=ppt/slideLayouts/slideLayout4.xml><?xml version="1.0" encoding="utf-8"?>
 <p:sldLayout xmlns:a="http://schemas.openxmlformats.org/drawingml/2006/main" xmlns:r="http://schemas.openxmlformats.org/officeDocument/2006/relationships" xmlns:p="http://schemas.openxmlformats.org/presentationml/2006/main" preserve="1" userDrawn="1">
   <p:cSld name="Title + Picture">
     <p:bg>
@@ -7110,9 +8338,9 @@
 </p:sldLayout>
 </file>
 
-<file path=ppt/slideLayouts/slideLayout4.xml><?xml version="1.0" encoding="utf-8"?>
+<file path=ppt/slideLayouts/slideLayout5.xml><?xml version="1.0" encoding="utf-8"?>
 <p:sldLayout xmlns:a="http://schemas.openxmlformats.org/drawingml/2006/main" xmlns:r="http://schemas.openxmlformats.org/officeDocument/2006/relationships" xmlns:p="http://schemas.openxmlformats.org/presentationml/2006/main" preserve="1" userDrawn="1">
-  <p:cSld name="Title + Subtitle + Picture">
+  <p:cSld name="Title + Subtitle slide">
     <p:bg>
       <p:bgPr>
         <a:gradFill>
@@ -7124,7 +8352,7 @@
               <a:schemeClr val="accent2"/>
             </a:gs>
           </a:gsLst>
-          <a:lin ang="2700000" scaled="1"/>
+          <a:lin ang="18000000" scaled="0"/>
         </a:gradFill>
         <a:effectLst/>
       </p:bgPr>
@@ -7161,12 +8389,12 @@
         </p:nvSpPr>
         <p:spPr>
           <a:xfrm>
-            <a:off x="1280159" y="640080"/>
+            <a:off x="1280159" y="3383280"/>
             <a:ext cx="10302240" cy="1852046"/>
           </a:xfrm>
         </p:spPr>
         <p:txBody>
-          <a:bodyPr lIns="0" tIns="0" rIns="0" bIns="0" anchor="b"/>
+          <a:bodyPr lIns="0" tIns="274320" rIns="0" bIns="0" anchor="t" anchorCtr="0"/>
           <a:lstStyle>
             <a:lvl1pPr algn="l">
               <a:lnSpc>
@@ -7187,130 +8415,6 @@
           </a:p>
         </p:txBody>
       </p:sp>
-      <p:sp>
-        <p:nvSpPr>
-          <p:cNvPr id="3" name="Subtitle 2">
-            <a:extLst>
-              <a:ext uri="{FF2B5EF4-FFF2-40B4-BE49-F238E27FC236}">
-                <a16:creationId xmlns:a16="http://schemas.microsoft.com/office/drawing/2014/main" id="{EC80FBD9-0977-4B2B-9318-30774BB0947C}"/>
-              </a:ext>
-            </a:extLst>
-          </p:cNvPr>
-          <p:cNvSpPr>
-            <a:spLocks noGrp="1"/>
-          </p:cNvSpPr>
-          <p:nvPr>
-            <p:ph type="subTitle" idx="1" hasCustomPrompt="1"/>
-          </p:nvPr>
-        </p:nvSpPr>
-        <p:spPr>
-          <a:xfrm>
-            <a:off x="1280158" y="2588447"/>
-            <a:ext cx="7853678" cy="726645"/>
-          </a:xfrm>
-        </p:spPr>
-        <p:txBody>
-          <a:bodyPr lIns="0" tIns="0" rIns="0" bIns="0" anchor="t" anchorCtr="0">
-            <a:normAutofit/>
-          </a:bodyPr>
-          <a:lstStyle>
-            <a:lvl1pPr marL="0" indent="0" algn="l">
-              <a:buNone/>
-              <a:defRPr sz="2400">
-                <a:solidFill>
-                  <a:schemeClr val="bg1"/>
-                </a:solidFill>
-              </a:defRPr>
-            </a:lvl1pPr>
-            <a:lvl2pPr marL="457200" indent="0" algn="ctr">
-              <a:buNone/>
-              <a:defRPr sz="2000"/>
-            </a:lvl2pPr>
-            <a:lvl3pPr marL="914400" indent="0" algn="ctr">
-              <a:buNone/>
-              <a:defRPr sz="1800"/>
-            </a:lvl3pPr>
-            <a:lvl4pPr marL="1371600" indent="0" algn="ctr">
-              <a:buNone/>
-              <a:defRPr sz="1600"/>
-            </a:lvl4pPr>
-            <a:lvl5pPr marL="1828800" indent="0" algn="ctr">
-              <a:buNone/>
-              <a:defRPr sz="1600"/>
-            </a:lvl5pPr>
-            <a:lvl6pPr marL="2286000" indent="0" algn="ctr">
-              <a:buNone/>
-              <a:defRPr sz="1600"/>
-            </a:lvl6pPr>
-            <a:lvl7pPr marL="2743200" indent="0" algn="ctr">
-              <a:buNone/>
-              <a:defRPr sz="1600"/>
-            </a:lvl7pPr>
-            <a:lvl8pPr marL="3200400" indent="0" algn="ctr">
-              <a:buNone/>
-              <a:defRPr sz="1600"/>
-            </a:lvl8pPr>
-            <a:lvl9pPr marL="3657600" indent="0" algn="ctr">
-              <a:buNone/>
-              <a:defRPr sz="1600"/>
-            </a:lvl9pPr>
-          </a:lstStyle>
-          <a:p>
-            <a:pPr lvl="0"/>
-            <a:r>
-              <a:rPr lang="en-US" dirty="0"/>
-              <a:t>Click to add text</a:t>
-            </a:r>
-          </a:p>
-        </p:txBody>
-      </p:sp>
-      <p:cxnSp>
-        <p:nvCxnSpPr>
-          <p:cNvPr id="9" name="Straight Connector 8">
-            <a:extLst>
-              <a:ext uri="{FF2B5EF4-FFF2-40B4-BE49-F238E27FC236}">
-                <a16:creationId xmlns:a16="http://schemas.microsoft.com/office/drawing/2014/main" id="{8E825845-66DD-4B77-A729-CD97D156FE6C}"/>
-              </a:ext>
-              <a:ext uri="{C183D7F6-B498-43B3-948B-1728B52AA6E4}">
-                <adec:decorative xmlns:adec="http://schemas.microsoft.com/office/drawing/2017/decorative" val="1"/>
-              </a:ext>
-            </a:extLst>
-          </p:cNvPr>
-          <p:cNvCxnSpPr>
-            <a:cxnSpLocks/>
-          </p:cNvCxnSpPr>
-          <p:nvPr userDrawn="1"/>
-        </p:nvCxnSpPr>
-        <p:spPr>
-          <a:xfrm>
-            <a:off x="1280160" y="3496322"/>
-            <a:ext cx="0" cy="3352800"/>
-          </a:xfrm>
-          <a:prstGeom prst="line">
-            <a:avLst/>
-          </a:prstGeom>
-          <a:ln w="25400" cap="sq">
-            <a:solidFill>
-              <a:schemeClr val="bg1"/>
-            </a:solidFill>
-            <a:bevel/>
-          </a:ln>
-        </p:spPr>
-        <p:style>
-          <a:lnRef idx="1">
-            <a:schemeClr val="accent1"/>
-          </a:lnRef>
-          <a:fillRef idx="0">
-            <a:schemeClr val="accent1"/>
-          </a:fillRef>
-          <a:effectRef idx="0">
-            <a:schemeClr val="accent1"/>
-          </a:effectRef>
-          <a:fontRef idx="minor">
-            <a:schemeClr val="tx1"/>
-          </a:fontRef>
-        </p:style>
-      </p:cxnSp>
       <p:grpSp>
         <p:nvGrpSpPr>
           <p:cNvPr id="4" name="Group 3">
@@ -7327,8 +8431,8 @@
           <p:nvPr userDrawn="1"/>
         </p:nvGrpSpPr>
         <p:grpSpPr>
-          <a:xfrm flipH="1">
-            <a:off x="7659974" y="4456458"/>
+          <a:xfrm>
+            <a:off x="10897692" y="620298"/>
             <a:ext cx="465456" cy="581432"/>
             <a:chOff x="7843462" y="2744546"/>
             <a:chExt cx="465456" cy="581432"/>
@@ -7775,166 +8879,59 @@
           </p:txBody>
         </p:sp>
       </p:grpSp>
-      <p:sp>
-        <p:nvSpPr>
-          <p:cNvPr id="5" name="Picture Placeholder 14">
+      <p:cxnSp>
+        <p:nvCxnSpPr>
+          <p:cNvPr id="5" name="Straight Connector 4">
             <a:extLst>
               <a:ext uri="{FF2B5EF4-FFF2-40B4-BE49-F238E27FC236}">
-                <a16:creationId xmlns:a16="http://schemas.microsoft.com/office/drawing/2014/main" id="{5DDB7824-50BA-B12F-AD49-CA8953CA3A0E}"/>
+                <a16:creationId xmlns:a16="http://schemas.microsoft.com/office/drawing/2014/main" id="{57912362-D30D-7B0B-BA94-0993B1EBC4E4}"/>
+              </a:ext>
+              <a:ext uri="{C183D7F6-B498-43B3-948B-1728B52AA6E4}">
+                <adec:decorative xmlns:adec="http://schemas.microsoft.com/office/drawing/2017/decorative" val="1"/>
               </a:ext>
             </a:extLst>
           </p:cNvPr>
-          <p:cNvSpPr>
-            <a:spLocks noGrp="1"/>
-          </p:cNvSpPr>
-          <p:nvPr>
-            <p:ph type="pic" sz="quarter" idx="13" hasCustomPrompt="1"/>
-          </p:nvPr>
-        </p:nvSpPr>
+          <p:cNvCxnSpPr>
+            <a:cxnSpLocks/>
+          </p:cNvCxnSpPr>
+          <p:nvPr userDrawn="1"/>
+        </p:nvCxnSpPr>
         <p:spPr>
           <a:xfrm>
-            <a:off x="8536252" y="3205313"/>
-            <a:ext cx="3043077" cy="3043083"/>
+            <a:off x="1280160" y="0"/>
+            <a:ext cx="0" cy="2775857"/>
           </a:xfrm>
-          <a:custGeom>
+          <a:prstGeom prst="line">
             <a:avLst/>
-            <a:gdLst>
-              <a:gd name="connsiteX0" fmla="*/ 2133823 w 4266960"/>
-              <a:gd name="connsiteY0" fmla="*/ 0 h 4266968"/>
-              <a:gd name="connsiteX1" fmla="*/ 4256628 w 4266960"/>
-              <a:gd name="connsiteY1" fmla="*/ 1915652 h 4266968"/>
-              <a:gd name="connsiteX2" fmla="*/ 4266960 w 4266960"/>
-              <a:gd name="connsiteY2" fmla="*/ 2120258 h 4266968"/>
-              <a:gd name="connsiteX3" fmla="*/ 4266960 w 4266960"/>
-              <a:gd name="connsiteY3" fmla="*/ 2147389 h 4266968"/>
-              <a:gd name="connsiteX4" fmla="*/ 4256628 w 4266960"/>
-              <a:gd name="connsiteY4" fmla="*/ 2351994 h 4266968"/>
-              <a:gd name="connsiteX5" fmla="*/ 2351994 w 4266960"/>
-              <a:gd name="connsiteY5" fmla="*/ 4256629 h 4266968"/>
-              <a:gd name="connsiteX6" fmla="*/ 2147230 w 4266960"/>
-              <a:gd name="connsiteY6" fmla="*/ 4266968 h 4266968"/>
-              <a:gd name="connsiteX7" fmla="*/ 2120416 w 4266960"/>
-              <a:gd name="connsiteY7" fmla="*/ 4266968 h 4266968"/>
-              <a:gd name="connsiteX8" fmla="*/ 1915652 w 4266960"/>
-              <a:gd name="connsiteY8" fmla="*/ 4256629 h 4266968"/>
-              <a:gd name="connsiteX9" fmla="*/ 0 w 4266960"/>
-              <a:gd name="connsiteY9" fmla="*/ 2133823 h 4266968"/>
-              <a:gd name="connsiteX10" fmla="*/ 2133823 w 4266960"/>
-              <a:gd name="connsiteY10" fmla="*/ 0 h 4266968"/>
-            </a:gdLst>
-            <a:ahLst/>
-            <a:cxnLst>
-              <a:cxn ang="0">
-                <a:pos x="connsiteX0" y="connsiteY0"/>
-              </a:cxn>
-              <a:cxn ang="0">
-                <a:pos x="connsiteX1" y="connsiteY1"/>
-              </a:cxn>
-              <a:cxn ang="0">
-                <a:pos x="connsiteX2" y="connsiteY2"/>
-              </a:cxn>
-              <a:cxn ang="0">
-                <a:pos x="connsiteX3" y="connsiteY3"/>
-              </a:cxn>
-              <a:cxn ang="0">
-                <a:pos x="connsiteX4" y="connsiteY4"/>
-              </a:cxn>
-              <a:cxn ang="0">
-                <a:pos x="connsiteX5" y="connsiteY5"/>
-              </a:cxn>
-              <a:cxn ang="0">
-                <a:pos x="connsiteX6" y="connsiteY6"/>
-              </a:cxn>
-              <a:cxn ang="0">
-                <a:pos x="connsiteX7" y="connsiteY7"/>
-              </a:cxn>
-              <a:cxn ang="0">
-                <a:pos x="connsiteX8" y="connsiteY8"/>
-              </a:cxn>
-              <a:cxn ang="0">
-                <a:pos x="connsiteX9" y="connsiteY9"/>
-              </a:cxn>
-              <a:cxn ang="0">
-                <a:pos x="connsiteX10" y="connsiteY10"/>
-              </a:cxn>
-            </a:cxnLst>
-            <a:rect l="l" t="t" r="r" b="b"/>
-            <a:pathLst>
-              <a:path w="4266960" h="4266968">
-                <a:moveTo>
-                  <a:pt x="2133823" y="0"/>
-                </a:moveTo>
-                <a:cubicBezTo>
-                  <a:pt x="3238644" y="0"/>
-                  <a:pt x="4147355" y="839660"/>
-                  <a:pt x="4256628" y="1915652"/>
-                </a:cubicBezTo>
-                <a:lnTo>
-                  <a:pt x="4266960" y="2120258"/>
-                </a:lnTo>
-                <a:lnTo>
-                  <a:pt x="4266960" y="2147389"/>
-                </a:lnTo>
-                <a:lnTo>
-                  <a:pt x="4256628" y="2351994"/>
-                </a:lnTo>
-                <a:cubicBezTo>
-                  <a:pt x="4154640" y="3356254"/>
-                  <a:pt x="3356253" y="4154640"/>
-                  <a:pt x="2351994" y="4256629"/>
-                </a:cubicBezTo>
-                <a:lnTo>
-                  <a:pt x="2147230" y="4266968"/>
-                </a:lnTo>
-                <a:lnTo>
-                  <a:pt x="2120416" y="4266968"/>
-                </a:lnTo>
-                <a:lnTo>
-                  <a:pt x="1915652" y="4256629"/>
-                </a:lnTo>
-                <a:cubicBezTo>
-                  <a:pt x="839660" y="4147356"/>
-                  <a:pt x="0" y="3238645"/>
-                  <a:pt x="0" y="2133823"/>
-                </a:cubicBezTo>
-                <a:cubicBezTo>
-                  <a:pt x="0" y="955346"/>
-                  <a:pt x="955346" y="0"/>
-                  <a:pt x="2133823" y="0"/>
-                </a:cubicBezTo>
-                <a:close/>
-              </a:path>
-            </a:pathLst>
-          </a:custGeom>
+          </a:prstGeom>
+          <a:ln w="25400" cap="sq">
+            <a:solidFill>
+              <a:schemeClr val="bg1"/>
+            </a:solidFill>
+            <a:bevel/>
+          </a:ln>
         </p:spPr>
-        <p:txBody>
-          <a:bodyPr wrap="square" tIns="914400" anchor="t" anchorCtr="0">
-            <a:noAutofit/>
-          </a:bodyPr>
-          <a:lstStyle>
-            <a:lvl1pPr algn="ctr">
-              <a:buNone/>
-              <a:defRPr sz="1800">
-                <a:solidFill>
-                  <a:schemeClr val="bg1"/>
-                </a:solidFill>
-              </a:defRPr>
-            </a:lvl1pPr>
-          </a:lstStyle>
-          <a:p>
-            <a:r>
-              <a:rPr lang="en-US" dirty="0"/>
-              <a:t>Click to add picture</a:t>
-            </a:r>
-          </a:p>
-        </p:txBody>
-      </p:sp>
+        <p:style>
+          <a:lnRef idx="1">
+            <a:schemeClr val="accent1"/>
+          </a:lnRef>
+          <a:fillRef idx="0">
+            <a:schemeClr val="accent1"/>
+          </a:fillRef>
+          <a:effectRef idx="0">
+            <a:schemeClr val="accent1"/>
+          </a:effectRef>
+          <a:fontRef idx="minor">
+            <a:schemeClr val="tx1"/>
+          </a:fontRef>
+        </p:style>
+      </p:cxnSp>
       <p:pic>
         <p:nvPicPr>
           <p:cNvPr id="6" name="Graphic 5" descr="Film reel with solid fill">
             <a:extLst>
               <a:ext uri="{FF2B5EF4-FFF2-40B4-BE49-F238E27FC236}">
-                <a16:creationId xmlns:a16="http://schemas.microsoft.com/office/drawing/2014/main" id="{3D9E900B-5319-2BAF-A983-ACC597E6872C}"/>
+                <a16:creationId xmlns:a16="http://schemas.microsoft.com/office/drawing/2014/main" id="{CE964357-751D-CEE3-415C-FC0780C599BC}"/>
               </a:ext>
             </a:extLst>
           </p:cNvPr>
@@ -7968,7 +8965,7 @@
     </p:spTree>
     <p:extLst>
       <p:ext uri="{BB962C8B-B14F-4D97-AF65-F5344CB8AC3E}">
-        <p14:creationId xmlns:p14="http://schemas.microsoft.com/office/powerpoint/2010/main" val="652645656"/>
+        <p14:creationId xmlns:p14="http://schemas.microsoft.com/office/powerpoint/2010/main" val="3577644934"/>
       </p:ext>
     </p:extLst>
   </p:cSld>
@@ -7978,7 +8975,7 @@
 </p:sldLayout>
 </file>
 
-<file path=ppt/slideLayouts/slideLayout5.xml><?xml version="1.0" encoding="utf-8"?>
+<file path=ppt/slideLayouts/slideLayout6.xml><?xml version="1.0" encoding="utf-8"?>
 <p:sldLayout xmlns:a="http://schemas.openxmlformats.org/drawingml/2006/main" xmlns:r="http://schemas.openxmlformats.org/officeDocument/2006/relationships" xmlns:p="http://schemas.openxmlformats.org/presentationml/2006/main" preserve="1" userDrawn="1">
   <p:cSld name="Title, image and content">
     <p:spTree>
@@ -8758,720 +9755,6 @@
     <p:extLst>
       <p:ext uri="{BB962C8B-B14F-4D97-AF65-F5344CB8AC3E}">
         <p14:creationId xmlns:p14="http://schemas.microsoft.com/office/powerpoint/2010/main" val="1897111348"/>
-      </p:ext>
-    </p:extLst>
-  </p:cSld>
-  <p:clrMapOvr>
-    <a:masterClrMapping/>
-  </p:clrMapOvr>
-</p:sldLayout>
-</file>
-
-<file path=ppt/slideLayouts/slideLayout6.xml><?xml version="1.0" encoding="utf-8"?>
-<p:sldLayout xmlns:a="http://schemas.openxmlformats.org/drawingml/2006/main" xmlns:r="http://schemas.openxmlformats.org/officeDocument/2006/relationships" xmlns:p="http://schemas.openxmlformats.org/presentationml/2006/main" type="title" preserve="1">
-  <p:cSld name="Title + Subtitle slide">
-    <p:bg>
-      <p:bgPr>
-        <a:gradFill>
-          <a:gsLst>
-            <a:gs pos="100000">
-              <a:schemeClr val="accent4"/>
-            </a:gs>
-            <a:gs pos="0">
-              <a:schemeClr val="accent2"/>
-            </a:gs>
-          </a:gsLst>
-          <a:lin ang="18000000" scaled="0"/>
-        </a:gradFill>
-        <a:effectLst/>
-      </p:bgPr>
-    </p:bg>
-    <p:spTree>
-      <p:nvGrpSpPr>
-        <p:cNvPr id="1" name=""/>
-        <p:cNvGrpSpPr/>
-        <p:nvPr/>
-      </p:nvGrpSpPr>
-      <p:grpSpPr>
-        <a:xfrm>
-          <a:off x="0" y="0"/>
-          <a:ext cx="0" cy="0"/>
-          <a:chOff x="0" y="0"/>
-          <a:chExt cx="0" cy="0"/>
-        </a:xfrm>
-      </p:grpSpPr>
-      <p:sp>
-        <p:nvSpPr>
-          <p:cNvPr id="2" name="Title 1">
-            <a:extLst>
-              <a:ext uri="{FF2B5EF4-FFF2-40B4-BE49-F238E27FC236}">
-                <a16:creationId xmlns:a16="http://schemas.microsoft.com/office/drawing/2014/main" id="{F6640AAD-80AF-40E7-BE3F-43D32FC68ED4}"/>
-              </a:ext>
-            </a:extLst>
-          </p:cNvPr>
-          <p:cNvSpPr>
-            <a:spLocks noGrp="1"/>
-          </p:cNvSpPr>
-          <p:nvPr>
-            <p:ph type="ctrTitle" hasCustomPrompt="1"/>
-          </p:nvPr>
-        </p:nvSpPr>
-        <p:spPr>
-          <a:xfrm>
-            <a:off x="1280159" y="3383280"/>
-            <a:ext cx="10302240" cy="1852046"/>
-          </a:xfrm>
-        </p:spPr>
-        <p:txBody>
-          <a:bodyPr lIns="0" tIns="274320" rIns="0" bIns="0" anchor="t" anchorCtr="0"/>
-          <a:lstStyle>
-            <a:lvl1pPr algn="l">
-              <a:lnSpc>
-                <a:spcPts val="5400"/>
-              </a:lnSpc>
-              <a:defRPr sz="5400" b="1" i="0" cap="all" spc="0" baseline="0">
-                <a:solidFill>
-                  <a:schemeClr val="bg1"/>
-                </a:solidFill>
-              </a:defRPr>
-            </a:lvl1pPr>
-          </a:lstStyle>
-          <a:p>
-            <a:r>
-              <a:rPr lang="en-US" dirty="0"/>
-              <a:t>Click to add title</a:t>
-            </a:r>
-          </a:p>
-        </p:txBody>
-      </p:sp>
-      <p:sp>
-        <p:nvSpPr>
-          <p:cNvPr id="3" name="Subtitle 2">
-            <a:extLst>
-              <a:ext uri="{FF2B5EF4-FFF2-40B4-BE49-F238E27FC236}">
-                <a16:creationId xmlns:a16="http://schemas.microsoft.com/office/drawing/2014/main" id="{EC80FBD9-0977-4B2B-9318-30774BB0947C}"/>
-              </a:ext>
-            </a:extLst>
-          </p:cNvPr>
-          <p:cNvSpPr>
-            <a:spLocks noGrp="1"/>
-          </p:cNvSpPr>
-          <p:nvPr>
-            <p:ph type="subTitle" idx="1" hasCustomPrompt="1"/>
-          </p:nvPr>
-        </p:nvSpPr>
-        <p:spPr>
-          <a:xfrm>
-            <a:off x="1280158" y="2966886"/>
-            <a:ext cx="10302237" cy="397191"/>
-          </a:xfrm>
-        </p:spPr>
-        <p:txBody>
-          <a:bodyPr lIns="0" tIns="0" rIns="0" bIns="0" anchor="b" anchorCtr="0">
-            <a:normAutofit/>
-          </a:bodyPr>
-          <a:lstStyle>
-            <a:lvl1pPr marL="0" indent="0" algn="l">
-              <a:buNone/>
-              <a:defRPr sz="2400">
-                <a:solidFill>
-                  <a:schemeClr val="bg1"/>
-                </a:solidFill>
-              </a:defRPr>
-            </a:lvl1pPr>
-            <a:lvl2pPr marL="457200" indent="0" algn="ctr">
-              <a:buNone/>
-              <a:defRPr sz="2000"/>
-            </a:lvl2pPr>
-            <a:lvl3pPr marL="914400" indent="0" algn="ctr">
-              <a:buNone/>
-              <a:defRPr sz="1800"/>
-            </a:lvl3pPr>
-            <a:lvl4pPr marL="1371600" indent="0" algn="ctr">
-              <a:buNone/>
-              <a:defRPr sz="1600"/>
-            </a:lvl4pPr>
-            <a:lvl5pPr marL="1828800" indent="0" algn="ctr">
-              <a:buNone/>
-              <a:defRPr sz="1600"/>
-            </a:lvl5pPr>
-            <a:lvl6pPr marL="2286000" indent="0" algn="ctr">
-              <a:buNone/>
-              <a:defRPr sz="1600"/>
-            </a:lvl6pPr>
-            <a:lvl7pPr marL="2743200" indent="0" algn="ctr">
-              <a:buNone/>
-              <a:defRPr sz="1600"/>
-            </a:lvl7pPr>
-            <a:lvl8pPr marL="3200400" indent="0" algn="ctr">
-              <a:buNone/>
-              <a:defRPr sz="1600"/>
-            </a:lvl8pPr>
-            <a:lvl9pPr marL="3657600" indent="0" algn="ctr">
-              <a:buNone/>
-              <a:defRPr sz="1600"/>
-            </a:lvl9pPr>
-          </a:lstStyle>
-          <a:p>
-            <a:pPr lvl="0"/>
-            <a:r>
-              <a:rPr lang="en-US" dirty="0"/>
-              <a:t>Click to add text</a:t>
-            </a:r>
-          </a:p>
-        </p:txBody>
-      </p:sp>
-      <p:grpSp>
-        <p:nvGrpSpPr>
-          <p:cNvPr id="4" name="Group 3">
-            <a:extLst>
-              <a:ext uri="{FF2B5EF4-FFF2-40B4-BE49-F238E27FC236}">
-                <a16:creationId xmlns:a16="http://schemas.microsoft.com/office/drawing/2014/main" id="{22749162-63A5-5BF9-895E-B0577A6C47E0}"/>
-              </a:ext>
-              <a:ext uri="{C183D7F6-B498-43B3-948B-1728B52AA6E4}">
-                <adec:decorative xmlns:adec="http://schemas.microsoft.com/office/drawing/2017/decorative" val="1"/>
-              </a:ext>
-            </a:extLst>
-          </p:cNvPr>
-          <p:cNvGrpSpPr/>
-          <p:nvPr userDrawn="1"/>
-        </p:nvGrpSpPr>
-        <p:grpSpPr>
-          <a:xfrm>
-            <a:off x="10897692" y="620298"/>
-            <a:ext cx="465456" cy="581432"/>
-            <a:chOff x="7843462" y="2744546"/>
-            <a:chExt cx="465456" cy="581432"/>
-          </a:xfrm>
-        </p:grpSpPr>
-        <p:sp>
-          <p:nvSpPr>
-            <p:cNvPr id="19" name="Graphic 12">
-              <a:extLst>
-                <a:ext uri="{FF2B5EF4-FFF2-40B4-BE49-F238E27FC236}">
-                  <a16:creationId xmlns:a16="http://schemas.microsoft.com/office/drawing/2014/main" id="{818B4386-1FCF-4ACE-BE25-AF9CC5E2256F}"/>
-                </a:ext>
-              </a:extLst>
-            </p:cNvPr>
-            <p:cNvSpPr/>
-            <p:nvPr userDrawn="1"/>
-          </p:nvSpPr>
-          <p:spPr>
-            <a:xfrm>
-              <a:off x="8217780" y="2973840"/>
-              <a:ext cx="91138" cy="91138"/>
-            </a:xfrm>
-            <a:custGeom>
-              <a:avLst/>
-              <a:gdLst>
-                <a:gd name="connsiteX0" fmla="*/ 91138 w 91138"/>
-                <a:gd name="connsiteY0" fmla="*/ 45569 h 91138"/>
-                <a:gd name="connsiteX1" fmla="*/ 45569 w 91138"/>
-                <a:gd name="connsiteY1" fmla="*/ 91138 h 91138"/>
-                <a:gd name="connsiteX2" fmla="*/ 0 w 91138"/>
-                <a:gd name="connsiteY2" fmla="*/ 45569 h 91138"/>
-                <a:gd name="connsiteX3" fmla="*/ 45569 w 91138"/>
-                <a:gd name="connsiteY3" fmla="*/ 0 h 91138"/>
-                <a:gd name="connsiteX4" fmla="*/ 91138 w 91138"/>
-                <a:gd name="connsiteY4" fmla="*/ 45569 h 91138"/>
-              </a:gdLst>
-              <a:ahLst/>
-              <a:cxnLst>
-                <a:cxn ang="0">
-                  <a:pos x="connsiteX0" y="connsiteY0"/>
-                </a:cxn>
-                <a:cxn ang="0">
-                  <a:pos x="connsiteX1" y="connsiteY1"/>
-                </a:cxn>
-                <a:cxn ang="0">
-                  <a:pos x="connsiteX2" y="connsiteY2"/>
-                </a:cxn>
-                <a:cxn ang="0">
-                  <a:pos x="connsiteX3" y="connsiteY3"/>
-                </a:cxn>
-                <a:cxn ang="0">
-                  <a:pos x="connsiteX4" y="connsiteY4"/>
-                </a:cxn>
-              </a:cxnLst>
-              <a:rect l="l" t="t" r="r" b="b"/>
-              <a:pathLst>
-                <a:path w="91138" h="91138">
-                  <a:moveTo>
-                    <a:pt x="91138" y="45569"/>
-                  </a:moveTo>
-                  <a:cubicBezTo>
-                    <a:pt x="91138" y="70736"/>
-                    <a:pt x="70736" y="91138"/>
-                    <a:pt x="45569" y="91138"/>
-                  </a:cubicBezTo>
-                  <a:cubicBezTo>
-                    <a:pt x="20402" y="91138"/>
-                    <a:pt x="0" y="70736"/>
-                    <a:pt x="0" y="45569"/>
-                  </a:cubicBezTo>
-                  <a:cubicBezTo>
-                    <a:pt x="0" y="20402"/>
-                    <a:pt x="20402" y="0"/>
-                    <a:pt x="45569" y="0"/>
-                  </a:cubicBezTo>
-                  <a:cubicBezTo>
-                    <a:pt x="70736" y="0"/>
-                    <a:pt x="91138" y="20402"/>
-                    <a:pt x="91138" y="45569"/>
-                  </a:cubicBezTo>
-                  <a:close/>
-                </a:path>
-              </a:pathLst>
-            </a:custGeom>
-            <a:solidFill>
-              <a:schemeClr val="bg1"/>
-            </a:solidFill>
-            <a:ln w="422" cap="flat">
-              <a:noFill/>
-              <a:prstDash val="solid"/>
-              <a:miter/>
-            </a:ln>
-          </p:spPr>
-          <p:txBody>
-            <a:bodyPr rtlCol="0" anchor="ctr"/>
-            <a:lstStyle/>
-            <a:p>
-              <a:endParaRPr lang="en-US" dirty="0"/>
-            </a:p>
-          </p:txBody>
-        </p:sp>
-        <p:sp>
-          <p:nvSpPr>
-            <p:cNvPr id="21" name="Graphic 13">
-              <a:extLst>
-                <a:ext uri="{FF2B5EF4-FFF2-40B4-BE49-F238E27FC236}">
-                  <a16:creationId xmlns:a16="http://schemas.microsoft.com/office/drawing/2014/main" id="{19319560-50ED-4963-A2CF-74663239D426}"/>
-                </a:ext>
-              </a:extLst>
-            </p:cNvPr>
-            <p:cNvSpPr/>
-            <p:nvPr userDrawn="1"/>
-          </p:nvSpPr>
-          <p:spPr>
-            <a:xfrm>
-              <a:off x="7859002" y="2744546"/>
-              <a:ext cx="139038" cy="139038"/>
-            </a:xfrm>
-            <a:custGeom>
-              <a:avLst/>
-              <a:gdLst>
-                <a:gd name="connsiteX0" fmla="*/ 129601 w 139038"/>
-                <a:gd name="connsiteY0" fmla="*/ 60082 h 139038"/>
-                <a:gd name="connsiteX1" fmla="*/ 78956 w 139038"/>
-                <a:gd name="connsiteY1" fmla="*/ 60082 h 139038"/>
-                <a:gd name="connsiteX2" fmla="*/ 78956 w 139038"/>
-                <a:gd name="connsiteY2" fmla="*/ 9437 h 139038"/>
-                <a:gd name="connsiteX3" fmla="*/ 69519 w 139038"/>
-                <a:gd name="connsiteY3" fmla="*/ 0 h 139038"/>
-                <a:gd name="connsiteX4" fmla="*/ 60082 w 139038"/>
-                <a:gd name="connsiteY4" fmla="*/ 9437 h 139038"/>
-                <a:gd name="connsiteX5" fmla="*/ 60082 w 139038"/>
-                <a:gd name="connsiteY5" fmla="*/ 60082 h 139038"/>
-                <a:gd name="connsiteX6" fmla="*/ 9437 w 139038"/>
-                <a:gd name="connsiteY6" fmla="*/ 60082 h 139038"/>
-                <a:gd name="connsiteX7" fmla="*/ 0 w 139038"/>
-                <a:gd name="connsiteY7" fmla="*/ 69519 h 139038"/>
-                <a:gd name="connsiteX8" fmla="*/ 9437 w 139038"/>
-                <a:gd name="connsiteY8" fmla="*/ 78956 h 139038"/>
-                <a:gd name="connsiteX9" fmla="*/ 60082 w 139038"/>
-                <a:gd name="connsiteY9" fmla="*/ 78956 h 139038"/>
-                <a:gd name="connsiteX10" fmla="*/ 60082 w 139038"/>
-                <a:gd name="connsiteY10" fmla="*/ 129601 h 139038"/>
-                <a:gd name="connsiteX11" fmla="*/ 69519 w 139038"/>
-                <a:gd name="connsiteY11" fmla="*/ 139038 h 139038"/>
-                <a:gd name="connsiteX12" fmla="*/ 78956 w 139038"/>
-                <a:gd name="connsiteY12" fmla="*/ 129601 h 139038"/>
-                <a:gd name="connsiteX13" fmla="*/ 78956 w 139038"/>
-                <a:gd name="connsiteY13" fmla="*/ 78956 h 139038"/>
-                <a:gd name="connsiteX14" fmla="*/ 129601 w 139038"/>
-                <a:gd name="connsiteY14" fmla="*/ 78956 h 139038"/>
-                <a:gd name="connsiteX15" fmla="*/ 139038 w 139038"/>
-                <a:gd name="connsiteY15" fmla="*/ 69519 h 139038"/>
-                <a:gd name="connsiteX16" fmla="*/ 129601 w 139038"/>
-                <a:gd name="connsiteY16" fmla="*/ 60082 h 139038"/>
-              </a:gdLst>
-              <a:ahLst/>
-              <a:cxnLst>
-                <a:cxn ang="0">
-                  <a:pos x="connsiteX0" y="connsiteY0"/>
-                </a:cxn>
-                <a:cxn ang="0">
-                  <a:pos x="connsiteX1" y="connsiteY1"/>
-                </a:cxn>
-                <a:cxn ang="0">
-                  <a:pos x="connsiteX2" y="connsiteY2"/>
-                </a:cxn>
-                <a:cxn ang="0">
-                  <a:pos x="connsiteX3" y="connsiteY3"/>
-                </a:cxn>
-                <a:cxn ang="0">
-                  <a:pos x="connsiteX4" y="connsiteY4"/>
-                </a:cxn>
-                <a:cxn ang="0">
-                  <a:pos x="connsiteX5" y="connsiteY5"/>
-                </a:cxn>
-                <a:cxn ang="0">
-                  <a:pos x="connsiteX6" y="connsiteY6"/>
-                </a:cxn>
-                <a:cxn ang="0">
-                  <a:pos x="connsiteX7" y="connsiteY7"/>
-                </a:cxn>
-                <a:cxn ang="0">
-                  <a:pos x="connsiteX8" y="connsiteY8"/>
-                </a:cxn>
-                <a:cxn ang="0">
-                  <a:pos x="connsiteX9" y="connsiteY9"/>
-                </a:cxn>
-                <a:cxn ang="0">
-                  <a:pos x="connsiteX10" y="connsiteY10"/>
-                </a:cxn>
-                <a:cxn ang="0">
-                  <a:pos x="connsiteX11" y="connsiteY11"/>
-                </a:cxn>
-                <a:cxn ang="0">
-                  <a:pos x="connsiteX12" y="connsiteY12"/>
-                </a:cxn>
-                <a:cxn ang="0">
-                  <a:pos x="connsiteX13" y="connsiteY13"/>
-                </a:cxn>
-                <a:cxn ang="0">
-                  <a:pos x="connsiteX14" y="connsiteY14"/>
-                </a:cxn>
-                <a:cxn ang="0">
-                  <a:pos x="connsiteX15" y="connsiteY15"/>
-                </a:cxn>
-                <a:cxn ang="0">
-                  <a:pos x="connsiteX16" y="connsiteY16"/>
-                </a:cxn>
-              </a:cxnLst>
-              <a:rect l="l" t="t" r="r" b="b"/>
-              <a:pathLst>
-                <a:path w="139038" h="139038">
-                  <a:moveTo>
-                    <a:pt x="129601" y="60082"/>
-                  </a:moveTo>
-                  <a:lnTo>
-                    <a:pt x="78956" y="60082"/>
-                  </a:lnTo>
-                  <a:lnTo>
-                    <a:pt x="78956" y="9437"/>
-                  </a:lnTo>
-                  <a:cubicBezTo>
-                    <a:pt x="78956" y="4225"/>
-                    <a:pt x="74731" y="0"/>
-                    <a:pt x="69519" y="0"/>
-                  </a:cubicBezTo>
-                  <a:cubicBezTo>
-                    <a:pt x="64307" y="0"/>
-                    <a:pt x="60082" y="4225"/>
-                    <a:pt x="60082" y="9437"/>
-                  </a:cubicBezTo>
-                  <a:lnTo>
-                    <a:pt x="60082" y="60082"/>
-                  </a:lnTo>
-                  <a:lnTo>
-                    <a:pt x="9437" y="60082"/>
-                  </a:lnTo>
-                  <a:cubicBezTo>
-                    <a:pt x="4225" y="60082"/>
-                    <a:pt x="0" y="64307"/>
-                    <a:pt x="0" y="69519"/>
-                  </a:cubicBezTo>
-                  <a:cubicBezTo>
-                    <a:pt x="0" y="74731"/>
-                    <a:pt x="4225" y="78956"/>
-                    <a:pt x="9437" y="78956"/>
-                  </a:cubicBezTo>
-                  <a:lnTo>
-                    <a:pt x="60082" y="78956"/>
-                  </a:lnTo>
-                  <a:lnTo>
-                    <a:pt x="60082" y="129601"/>
-                  </a:lnTo>
-                  <a:cubicBezTo>
-                    <a:pt x="60082" y="134813"/>
-                    <a:pt x="64307" y="139038"/>
-                    <a:pt x="69519" y="139038"/>
-                  </a:cubicBezTo>
-                  <a:cubicBezTo>
-                    <a:pt x="74731" y="139038"/>
-                    <a:pt x="78956" y="134813"/>
-                    <a:pt x="78956" y="129601"/>
-                  </a:cubicBezTo>
-                  <a:lnTo>
-                    <a:pt x="78956" y="78956"/>
-                  </a:lnTo>
-                  <a:lnTo>
-                    <a:pt x="129601" y="78956"/>
-                  </a:lnTo>
-                  <a:cubicBezTo>
-                    <a:pt x="134813" y="78956"/>
-                    <a:pt x="139038" y="74731"/>
-                    <a:pt x="139038" y="69519"/>
-                  </a:cubicBezTo>
-                  <a:cubicBezTo>
-                    <a:pt x="139038" y="64307"/>
-                    <a:pt x="134813" y="60082"/>
-                    <a:pt x="129601" y="60082"/>
-                  </a:cubicBezTo>
-                  <a:close/>
-                </a:path>
-              </a:pathLst>
-            </a:custGeom>
-            <a:solidFill>
-              <a:schemeClr val="bg1"/>
-            </a:solidFill>
-            <a:ln w="603" cap="flat">
-              <a:noFill/>
-              <a:prstDash val="solid"/>
-              <a:miter/>
-            </a:ln>
-          </p:spPr>
-          <p:txBody>
-            <a:bodyPr rtlCol="0" anchor="ctr"/>
-            <a:lstStyle/>
-            <a:p>
-              <a:endParaRPr lang="en-US" dirty="0"/>
-            </a:p>
-          </p:txBody>
-        </p:sp>
-        <p:sp>
-          <p:nvSpPr>
-            <p:cNvPr id="23" name="Graphic 15">
-              <a:extLst>
-                <a:ext uri="{FF2B5EF4-FFF2-40B4-BE49-F238E27FC236}">
-                  <a16:creationId xmlns:a16="http://schemas.microsoft.com/office/drawing/2014/main" id="{E5ABBDAD-943D-48F3-9C80-B29C48966C79}"/>
-                </a:ext>
-              </a:extLst>
-            </p:cNvPr>
-            <p:cNvSpPr/>
-            <p:nvPr userDrawn="1"/>
-          </p:nvSpPr>
-          <p:spPr>
-            <a:xfrm>
-              <a:off x="7843462" y="3198265"/>
-              <a:ext cx="127713" cy="127713"/>
-            </a:xfrm>
-            <a:custGeom>
-              <a:avLst/>
-              <a:gdLst>
-                <a:gd name="connsiteX0" fmla="*/ 63857 w 127713"/>
-                <a:gd name="connsiteY0" fmla="*/ 18874 h 127713"/>
-                <a:gd name="connsiteX1" fmla="*/ 108839 w 127713"/>
-                <a:gd name="connsiteY1" fmla="*/ 63857 h 127713"/>
-                <a:gd name="connsiteX2" fmla="*/ 63857 w 127713"/>
-                <a:gd name="connsiteY2" fmla="*/ 108839 h 127713"/>
-                <a:gd name="connsiteX3" fmla="*/ 18874 w 127713"/>
-                <a:gd name="connsiteY3" fmla="*/ 63857 h 127713"/>
-                <a:gd name="connsiteX4" fmla="*/ 63857 w 127713"/>
-                <a:gd name="connsiteY4" fmla="*/ 18874 h 127713"/>
-                <a:gd name="connsiteX5" fmla="*/ 63857 w 127713"/>
-                <a:gd name="connsiteY5" fmla="*/ 0 h 127713"/>
-                <a:gd name="connsiteX6" fmla="*/ 0 w 127713"/>
-                <a:gd name="connsiteY6" fmla="*/ 63857 h 127713"/>
-                <a:gd name="connsiteX7" fmla="*/ 63857 w 127713"/>
-                <a:gd name="connsiteY7" fmla="*/ 127713 h 127713"/>
-                <a:gd name="connsiteX8" fmla="*/ 127713 w 127713"/>
-                <a:gd name="connsiteY8" fmla="*/ 63857 h 127713"/>
-                <a:gd name="connsiteX9" fmla="*/ 63857 w 127713"/>
-                <a:gd name="connsiteY9" fmla="*/ 0 h 127713"/>
-              </a:gdLst>
-              <a:ahLst/>
-              <a:cxnLst>
-                <a:cxn ang="0">
-                  <a:pos x="connsiteX0" y="connsiteY0"/>
-                </a:cxn>
-                <a:cxn ang="0">
-                  <a:pos x="connsiteX1" y="connsiteY1"/>
-                </a:cxn>
-                <a:cxn ang="0">
-                  <a:pos x="connsiteX2" y="connsiteY2"/>
-                </a:cxn>
-                <a:cxn ang="0">
-                  <a:pos x="connsiteX3" y="connsiteY3"/>
-                </a:cxn>
-                <a:cxn ang="0">
-                  <a:pos x="connsiteX4" y="connsiteY4"/>
-                </a:cxn>
-                <a:cxn ang="0">
-                  <a:pos x="connsiteX5" y="connsiteY5"/>
-                </a:cxn>
-                <a:cxn ang="0">
-                  <a:pos x="connsiteX6" y="connsiteY6"/>
-                </a:cxn>
-                <a:cxn ang="0">
-                  <a:pos x="connsiteX7" y="connsiteY7"/>
-                </a:cxn>
-                <a:cxn ang="0">
-                  <a:pos x="connsiteX8" y="connsiteY8"/>
-                </a:cxn>
-                <a:cxn ang="0">
-                  <a:pos x="connsiteX9" y="connsiteY9"/>
-                </a:cxn>
-              </a:cxnLst>
-              <a:rect l="l" t="t" r="r" b="b"/>
-              <a:pathLst>
-                <a:path w="127713" h="127713">
-                  <a:moveTo>
-                    <a:pt x="63857" y="18874"/>
-                  </a:moveTo>
-                  <a:cubicBezTo>
-                    <a:pt x="88700" y="18874"/>
-                    <a:pt x="108839" y="39013"/>
-                    <a:pt x="108839" y="63857"/>
-                  </a:cubicBezTo>
-                  <a:cubicBezTo>
-                    <a:pt x="108839" y="88700"/>
-                    <a:pt x="88700" y="108839"/>
-                    <a:pt x="63857" y="108839"/>
-                  </a:cubicBezTo>
-                  <a:cubicBezTo>
-                    <a:pt x="39013" y="108839"/>
-                    <a:pt x="18874" y="88700"/>
-                    <a:pt x="18874" y="63857"/>
-                  </a:cubicBezTo>
-                  <a:cubicBezTo>
-                    <a:pt x="18898" y="39023"/>
-                    <a:pt x="39023" y="18898"/>
-                    <a:pt x="63857" y="18874"/>
-                  </a:cubicBezTo>
-                  <a:moveTo>
-                    <a:pt x="63857" y="0"/>
-                  </a:moveTo>
-                  <a:cubicBezTo>
-                    <a:pt x="28590" y="0"/>
-                    <a:pt x="0" y="28590"/>
-                    <a:pt x="0" y="63857"/>
-                  </a:cubicBezTo>
-                  <a:cubicBezTo>
-                    <a:pt x="0" y="99124"/>
-                    <a:pt x="28590" y="127713"/>
-                    <a:pt x="63857" y="127713"/>
-                  </a:cubicBezTo>
-                  <a:cubicBezTo>
-                    <a:pt x="99124" y="127713"/>
-                    <a:pt x="127713" y="99124"/>
-                    <a:pt x="127713" y="63857"/>
-                  </a:cubicBezTo>
-                  <a:cubicBezTo>
-                    <a:pt x="127713" y="28590"/>
-                    <a:pt x="99124" y="0"/>
-                    <a:pt x="63857" y="0"/>
-                  </a:cubicBezTo>
-                  <a:close/>
-                </a:path>
-              </a:pathLst>
-            </a:custGeom>
-            <a:solidFill>
-              <a:schemeClr val="bg1"/>
-            </a:solidFill>
-            <a:ln w="610" cap="flat">
-              <a:noFill/>
-              <a:prstDash val="solid"/>
-              <a:miter/>
-            </a:ln>
-          </p:spPr>
-          <p:txBody>
-            <a:bodyPr rtlCol="0" anchor="ctr"/>
-            <a:lstStyle/>
-            <a:p>
-              <a:endParaRPr lang="en-US" dirty="0"/>
-            </a:p>
-          </p:txBody>
-        </p:sp>
-      </p:grpSp>
-      <p:cxnSp>
-        <p:nvCxnSpPr>
-          <p:cNvPr id="5" name="Straight Connector 4">
-            <a:extLst>
-              <a:ext uri="{FF2B5EF4-FFF2-40B4-BE49-F238E27FC236}">
-                <a16:creationId xmlns:a16="http://schemas.microsoft.com/office/drawing/2014/main" id="{57912362-D30D-7B0B-BA94-0993B1EBC4E4}"/>
-              </a:ext>
-              <a:ext uri="{C183D7F6-B498-43B3-948B-1728B52AA6E4}">
-                <adec:decorative xmlns:adec="http://schemas.microsoft.com/office/drawing/2017/decorative" val="1"/>
-              </a:ext>
-            </a:extLst>
-          </p:cNvPr>
-          <p:cNvCxnSpPr>
-            <a:cxnSpLocks/>
-          </p:cNvCxnSpPr>
-          <p:nvPr userDrawn="1"/>
-        </p:nvCxnSpPr>
-        <p:spPr>
-          <a:xfrm>
-            <a:off x="1280160" y="0"/>
-            <a:ext cx="0" cy="2775857"/>
-          </a:xfrm>
-          <a:prstGeom prst="line">
-            <a:avLst/>
-          </a:prstGeom>
-          <a:ln w="25400" cap="sq">
-            <a:solidFill>
-              <a:schemeClr val="bg1"/>
-            </a:solidFill>
-            <a:bevel/>
-          </a:ln>
-        </p:spPr>
-        <p:style>
-          <a:lnRef idx="1">
-            <a:schemeClr val="accent1"/>
-          </a:lnRef>
-          <a:fillRef idx="0">
-            <a:schemeClr val="accent1"/>
-          </a:fillRef>
-          <a:effectRef idx="0">
-            <a:schemeClr val="accent1"/>
-          </a:effectRef>
-          <a:fontRef idx="minor">
-            <a:schemeClr val="tx1"/>
-          </a:fontRef>
-        </p:style>
-      </p:cxnSp>
-      <p:pic>
-        <p:nvPicPr>
-          <p:cNvPr id="6" name="Graphic 5" descr="Film reel with solid fill">
-            <a:extLst>
-              <a:ext uri="{FF2B5EF4-FFF2-40B4-BE49-F238E27FC236}">
-                <a16:creationId xmlns:a16="http://schemas.microsoft.com/office/drawing/2014/main" id="{CE964357-751D-CEE3-415C-FC0780C599BC}"/>
-              </a:ext>
-            </a:extLst>
-          </p:cNvPr>
-          <p:cNvPicPr>
-            <a:picLocks noChangeAspect="1"/>
-          </p:cNvPicPr>
-          <p:nvPr userDrawn="1"/>
-        </p:nvPicPr>
-        <p:blipFill>
-          <a:blip r:embed="rId2">
-            <a:extLst>
-              <a:ext uri="{96DAC541-7B7A-43D3-8B79-37D633B846F1}">
-                <asvg:svgBlip xmlns:asvg="http://schemas.microsoft.com/office/drawing/2016/SVG/main" r:embed="rId3"/>
-              </a:ext>
-            </a:extLst>
-          </a:blip>
-          <a:stretch>
-            <a:fillRect/>
-          </a:stretch>
-        </p:blipFill>
-        <p:spPr>
-          <a:xfrm>
-            <a:off x="11168307" y="0"/>
-            <a:ext cx="914400" cy="914400"/>
-          </a:xfrm>
-          <a:prstGeom prst="rect">
-            <a:avLst/>
-          </a:prstGeom>
-        </p:spPr>
-      </p:pic>
-    </p:spTree>
-    <p:extLst>
-      <p:ext uri="{BB962C8B-B14F-4D97-AF65-F5344CB8AC3E}">
-        <p14:creationId xmlns:p14="http://schemas.microsoft.com/office/powerpoint/2010/main" val="3577644934"/>
       </p:ext>
     </p:extLst>
   </p:cSld>
@@ -11599,12 +11882,12 @@
   </p:cSld>
   <p:clrMap bg1="lt1" tx1="dk1" bg2="lt2" tx2="dk2" accent1="accent1" accent2="accent2" accent3="accent3" accent4="accent4" accent5="accent5" accent6="accent6" hlink="hlink" folHlink="folHlink"/>
   <p:sldLayoutIdLst>
-    <p:sldLayoutId id="2147483708" r:id="rId1"/>
-    <p:sldLayoutId id="2147483717" r:id="rId2"/>
-    <p:sldLayoutId id="2147483728" r:id="rId3"/>
-    <p:sldLayoutId id="2147483729" r:id="rId4"/>
-    <p:sldLayoutId id="2147483710" r:id="rId5"/>
-    <p:sldLayoutId id="2147483727" r:id="rId6"/>
+    <p:sldLayoutId id="2147483729" r:id="rId1"/>
+    <p:sldLayoutId id="2147483708" r:id="rId2"/>
+    <p:sldLayoutId id="2147483717" r:id="rId3"/>
+    <p:sldLayoutId id="2147483728" r:id="rId4"/>
+    <p:sldLayoutId id="2147483727" r:id="rId5"/>
+    <p:sldLayoutId id="2147483710" r:id="rId6"/>
     <p:sldLayoutId id="2147483701" r:id="rId7"/>
     <p:sldLayoutId id="2147483721" r:id="rId8"/>
     <p:sldLayoutId id="2147483720" r:id="rId9"/>
@@ -11612,7 +11895,6 @@
     <p:sldLayoutId id="2147483722" r:id="rId11"/>
     <p:sldLayoutId id="2147483698" r:id="rId12"/>
     <p:sldLayoutId id="2147483732" r:id="rId13"/>
-    <p:sldLayoutId id="2147483702" r:id="rId14"/>
   </p:sldLayoutIdLst>
   <p:hf sldNum="0" hdr="0" ftr="0"/>
   <p:txStyles>
@@ -11931,12 +12213,7 @@
             <p:ph type="ctrTitle"/>
           </p:nvPr>
         </p:nvSpPr>
-        <p:spPr>
-          <a:xfrm>
-            <a:off x="1280159" y="357809"/>
-            <a:ext cx="7983110" cy="3080335"/>
-          </a:xfrm>
-        </p:spPr>
+        <p:spPr/>
         <p:txBody>
           <a:bodyPr/>
           <a:lstStyle/>
@@ -12063,7 +12340,7 @@
         </p:nvGraphicFramePr>
         <p:xfrm>
           <a:off x="1279525" y="3017838"/>
-          <a:ext cx="10374792" cy="3386137"/>
+          <a:ext cx="10374313" cy="3208337"/>
         </p:xfrm>
         <a:graphic>
           <a:graphicData uri="http://schemas.openxmlformats.org/drawingml/2006/table">
@@ -12529,12 +12806,7 @@
             <p:ph type="title"/>
           </p:nvPr>
         </p:nvSpPr>
-        <p:spPr>
-          <a:xfrm>
-            <a:off x="1280159" y="4970638"/>
-            <a:ext cx="9144000" cy="1280160"/>
-          </a:xfrm>
-        </p:spPr>
+        <p:spPr/>
         <p:txBody>
           <a:bodyPr/>
           <a:lstStyle/>
@@ -12562,12 +12834,7 @@
             <p:ph sz="half" idx="2"/>
           </p:nvPr>
         </p:nvSpPr>
-        <p:spPr>
-          <a:xfrm>
-            <a:off x="1280160" y="685800"/>
-            <a:ext cx="4937760" cy="4023360"/>
-          </a:xfrm>
-        </p:spPr>
+        <p:spPr/>
         <p:txBody>
           <a:bodyPr/>
           <a:lstStyle/>
@@ -12644,12 +12911,7 @@
             <p:ph sz="quarter" idx="4"/>
           </p:nvPr>
         </p:nvSpPr>
-        <p:spPr>
-          <a:xfrm>
-            <a:off x="6704755" y="685800"/>
-            <a:ext cx="4937760" cy="4023360"/>
-          </a:xfrm>
-        </p:spPr>
+        <p:spPr/>
         <p:txBody>
           <a:bodyPr>
             <a:normAutofit/>
@@ -12736,12 +12998,7 @@
             <p:ph type="title"/>
           </p:nvPr>
         </p:nvSpPr>
-        <p:spPr>
-          <a:xfrm>
-            <a:off x="1280160" y="640080"/>
-            <a:ext cx="10087699" cy="1280160"/>
-          </a:xfrm>
-        </p:spPr>
+        <p:spPr/>
         <p:txBody>
           <a:bodyPr anchor="b" anchorCtr="0"/>
           <a:lstStyle/>
@@ -13242,12 +13499,7 @@
             <p:ph type="title"/>
           </p:nvPr>
         </p:nvSpPr>
-        <p:spPr>
-          <a:xfrm>
-            <a:off x="2792897" y="585216"/>
-            <a:ext cx="8965094" cy="2276856"/>
-          </a:xfrm>
-        </p:spPr>
+        <p:spPr/>
         <p:txBody>
           <a:bodyPr/>
           <a:lstStyle/>
@@ -13280,12 +13532,7 @@
           <a:srcRect l="13191" r="13191"/>
           <a:stretch/>
         </p:blipFill>
-        <p:spPr>
-          <a:xfrm>
-            <a:off x="1371606" y="3205313"/>
-            <a:ext cx="3043077" cy="3043083"/>
-          </a:xfrm>
-        </p:spPr>
+        <p:spPr/>
       </p:pic>
       <p:sp>
         <p:nvSpPr>
@@ -13303,12 +13550,7 @@
             <p:ph type="body" sz="quarter" idx="13"/>
           </p:nvPr>
         </p:nvSpPr>
-        <p:spPr>
-          <a:xfrm>
-            <a:off x="5640609" y="3127248"/>
-            <a:ext cx="6117381" cy="3017520"/>
-          </a:xfrm>
-        </p:spPr>
+        <p:spPr/>
         <p:txBody>
           <a:bodyPr/>
           <a:lstStyle/>
@@ -13500,12 +13742,7 @@
             <p:ph type="ctrTitle"/>
           </p:nvPr>
         </p:nvSpPr>
-        <p:spPr>
-          <a:xfrm>
-            <a:off x="1280159" y="3386775"/>
-            <a:ext cx="8311102" cy="3080335"/>
-          </a:xfrm>
-        </p:spPr>
+        <p:spPr/>
         <p:txBody>
           <a:bodyPr/>
           <a:lstStyle/>
@@ -13538,12 +13775,7 @@
           <a:srcRect l="23" r="23"/>
           <a:stretch/>
         </p:blipFill>
-        <p:spPr>
-          <a:xfrm>
-            <a:off x="8197587" y="411831"/>
-            <a:ext cx="3521337" cy="3521344"/>
-          </a:xfrm>
-        </p:spPr>
+        <p:spPr/>
       </p:pic>
     </p:spTree>
     <p:extLst>
@@ -13644,7 +13876,7 @@
             <a:picLocks noGrp="1" noChangeAspect="1"/>
           </p:cNvPicPr>
           <p:nvPr>
-            <p:ph type="pic" sz="quarter" idx="13"/>
+            <p:ph type="pic" sz="quarter" idx="4294967295"/>
           </p:nvPr>
         </p:nvPicPr>
         <p:blipFill rotWithShape="1">
@@ -13652,7 +13884,12 @@
           <a:srcRect l="16939" r="16939"/>
           <a:stretch/>
         </p:blipFill>
-        <p:spPr/>
+        <p:spPr>
+          <a:xfrm>
+            <a:off x="2273300" y="1825625"/>
+            <a:ext cx="9918700" cy="4351338"/>
+          </a:xfrm>
+        </p:spPr>
       </p:pic>
     </p:spTree>
     <p:extLst>
@@ -13852,12 +14089,19 @@
             <a:spLocks noGrp="1"/>
           </p:cNvSpPr>
           <p:nvPr>
-            <p:ph type="subTitle" idx="1"/>
+            <p:ph type="subTitle" idx="4294967295"/>
           </p:nvPr>
         </p:nvSpPr>
-        <p:spPr/>
+        <p:spPr>
+          <a:xfrm>
+            <a:off x="1889125" y="2967038"/>
+            <a:ext cx="10302875" cy="396875"/>
+          </a:xfrm>
+        </p:spPr>
         <p:txBody>
-          <a:bodyPr/>
+          <a:bodyPr>
+            <a:normAutofit fontScale="92500" lnSpcReduction="20000"/>
+          </a:bodyPr>
           <a:lstStyle/>
           <a:p>
             <a:r>
@@ -13913,12 +14157,7 @@
             <p:ph type="title"/>
           </p:nvPr>
         </p:nvSpPr>
-        <p:spPr>
-          <a:xfrm>
-            <a:off x="1280160" y="685800"/>
-            <a:ext cx="9137012" cy="1280160"/>
-          </a:xfrm>
-        </p:spPr>
+        <p:spPr/>
         <p:txBody>
           <a:bodyPr/>
           <a:lstStyle/>
@@ -13946,12 +14185,7 @@
             <p:ph sz="half" idx="2"/>
           </p:nvPr>
         </p:nvSpPr>
-        <p:spPr>
-          <a:xfrm>
-            <a:off x="1280160" y="2327440"/>
-            <a:ext cx="4846320" cy="4040574"/>
-          </a:xfrm>
-        </p:spPr>
+        <p:spPr/>
         <p:txBody>
           <a:bodyPr/>
           <a:lstStyle/>
@@ -14003,12 +14237,7 @@
             <p:ph sz="quarter" idx="4"/>
           </p:nvPr>
         </p:nvSpPr>
-        <p:spPr>
-          <a:xfrm>
-            <a:off x="6723402" y="2327441"/>
-            <a:ext cx="4846320" cy="4040574"/>
-          </a:xfrm>
-        </p:spPr>
+        <p:spPr/>
         <p:txBody>
           <a:bodyPr/>
           <a:lstStyle/>
@@ -14268,12 +14497,7 @@
             <p:ph type="ctrTitle"/>
           </p:nvPr>
         </p:nvSpPr>
-        <p:spPr>
-          <a:xfrm>
-            <a:off x="1280160" y="301752"/>
-            <a:ext cx="4663438" cy="2441448"/>
-          </a:xfrm>
-        </p:spPr>
+        <p:spPr/>
         <p:txBody>
           <a:bodyPr/>
           <a:lstStyle/>
@@ -14301,12 +14525,7 @@
             <p:ph type="body" sz="quarter" idx="14"/>
           </p:nvPr>
         </p:nvSpPr>
-        <p:spPr>
-          <a:xfrm>
-            <a:off x="1280161" y="2777067"/>
-            <a:ext cx="4663440" cy="3550581"/>
-          </a:xfrm>
-        </p:spPr>
+        <p:spPr/>
         <p:txBody>
           <a:bodyPr/>
           <a:lstStyle/>
@@ -14345,12 +14564,7 @@
           <a:srcRect l="22444" r="22444"/>
           <a:stretch/>
         </p:blipFill>
-        <p:spPr>
-          <a:xfrm>
-            <a:off x="6695553" y="301752"/>
-            <a:ext cx="5221224" cy="6263640"/>
-          </a:xfrm>
-        </p:spPr>
+        <p:spPr/>
       </p:pic>
     </p:spTree>
     <p:extLst>
@@ -15157,15 +15371,6 @@
 </file>
 
 <file path=customXml/item1.xml><?xml version="1.0" encoding="utf-8"?>
-<?mso-contentType ?>
-<FormTemplates xmlns="http://schemas.microsoft.com/sharepoint/v3/contenttype/forms">
-  <Display>DocumentLibraryForm</Display>
-  <Edit>DocumentLibraryForm</Edit>
-  <New>DocumentLibraryForm</New>
-</FormTemplates>
-</file>
-
-<file path=customXml/item2.xml><?xml version="1.0" encoding="utf-8"?>
 <p:properties xmlns:p="http://schemas.microsoft.com/office/2006/metadata/properties" xmlns:xsi="http://www.w3.org/2001/XMLSchema-instance" xmlns:pc="http://schemas.microsoft.com/office/infopath/2007/PartnerControls">
   <documentManagement>
     <_ip_UnifiedCompliancePolicyUIAction xmlns="http://schemas.microsoft.com/sharepoint/v3" xsi:nil="true"/>
@@ -15183,6 +15388,15 @@
     <MediaServiceKeyPoints xmlns="71af3243-3dd4-4a8d-8c0d-dd76da1f02a5" xsi:nil="true"/>
   </documentManagement>
 </p:properties>
+</file>
+
+<file path=customXml/item2.xml><?xml version="1.0" encoding="utf-8"?>
+<?mso-contentType ?>
+<FormTemplates xmlns="http://schemas.microsoft.com/sharepoint/v3/contenttype/forms">
+  <Display>DocumentLibraryForm</Display>
+  <Edit>DocumentLibraryForm</Edit>
+  <New>DocumentLibraryForm</New>
+</FormTemplates>
 </file>
 
 <file path=customXml/item3.xml><?xml version="1.0" encoding="utf-8"?>
@@ -15498,14 +15712,6 @@
 </file>
 
 <file path=customXml/itemProps1.xml><?xml version="1.0" encoding="utf-8"?>
-<ds:datastoreItem xmlns:ds="http://schemas.openxmlformats.org/officeDocument/2006/customXml" ds:itemID="{FABD9919-8F5A-4B99-83E1-E90FE1DCF2E1}">
-  <ds:schemaRefs>
-    <ds:schemaRef ds:uri="http://schemas.microsoft.com/sharepoint/v3/contenttype/forms"/>
-  </ds:schemaRefs>
-</ds:datastoreItem>
-</file>
-
-<file path=customXml/itemProps2.xml><?xml version="1.0" encoding="utf-8"?>
 <ds:datastoreItem xmlns:ds="http://schemas.openxmlformats.org/officeDocument/2006/customXml" ds:itemID="{80E87F72-70BF-43BC-A0D4-53665DC12672}">
   <ds:schemaRefs>
     <ds:schemaRef ds:uri="http://schemas.microsoft.com/office/2006/metadata/properties"/>
@@ -15513,6 +15719,14 @@
     <ds:schemaRef ds:uri="http://schemas.microsoft.com/sharepoint/v3"/>
     <ds:schemaRef ds:uri="71af3243-3dd4-4a8d-8c0d-dd76da1f02a5"/>
     <ds:schemaRef ds:uri="230e9df3-be65-4c73-a93b-d1236ebd677e"/>
+  </ds:schemaRefs>
+</ds:datastoreItem>
+</file>
+
+<file path=customXml/itemProps2.xml><?xml version="1.0" encoding="utf-8"?>
+<ds:datastoreItem xmlns:ds="http://schemas.openxmlformats.org/officeDocument/2006/customXml" ds:itemID="{FABD9919-8F5A-4B99-83E1-E90FE1DCF2E1}">
+  <ds:schemaRefs>
+    <ds:schemaRef ds:uri="http://schemas.microsoft.com/sharepoint/v3/contenttype/forms"/>
   </ds:schemaRefs>
 </ds:datastoreItem>
 </file>

</xml_diff>